<commit_message>
refacotoring with breaking changes to the httpclient registration. issue #1
</commit_message>
<xml_diff>
--- a/Bet.Extensions.Resilience.pptx
+++ b/Bet.Extensions.Resilience.pptx
@@ -5697,6 +5697,174 @@
           <a:chExt cx="0" cy="0"/>
         </a:xfrm>
       </p:grpSpPr>
+      <p:sp>
+        <p:nvSpPr>
+          <p:cNvPr id="4" name="Rectangle 3">
+            <a:extLst>
+              <a:ext uri="{FF2B5EF4-FFF2-40B4-BE49-F238E27FC236}">
+                <a16:creationId xmlns:a16="http://schemas.microsoft.com/office/drawing/2014/main" id="{65101ED6-2A6F-412A-A147-F42F0E113992}"/>
+              </a:ext>
+            </a:extLst>
+          </p:cNvPr>
+          <p:cNvSpPr/>
+          <p:nvPr/>
+        </p:nvSpPr>
+        <p:spPr>
+          <a:xfrm>
+            <a:off x="479372" y="895417"/>
+            <a:ext cx="3163045" cy="369332"/>
+          </a:xfrm>
+          <a:prstGeom prst="rect">
+            <a:avLst/>
+          </a:prstGeom>
+        </p:spPr>
+        <p:txBody>
+          <a:bodyPr wrap="none">
+            <a:spAutoFit/>
+          </a:bodyPr>
+          <a:lstStyle/>
+          <a:p>
+            <a:r>
+              <a:rPr lang="en-US" dirty="0" err="1"/>
+              <a:t>ResilienceHttpClientBuilder</a:t>
+            </a:r>
+            <a:endParaRPr lang="en-US" dirty="0"/>
+          </a:p>
+        </p:txBody>
+      </p:sp>
+      <p:sp>
+        <p:nvSpPr>
+          <p:cNvPr id="5" name="Rectangle 4">
+            <a:extLst>
+              <a:ext uri="{FF2B5EF4-FFF2-40B4-BE49-F238E27FC236}">
+                <a16:creationId xmlns:a16="http://schemas.microsoft.com/office/drawing/2014/main" id="{3FADF21D-3A69-43BC-9994-DF454CB02575}"/>
+              </a:ext>
+            </a:extLst>
+          </p:cNvPr>
+          <p:cNvSpPr/>
+          <p:nvPr/>
+        </p:nvSpPr>
+        <p:spPr>
+          <a:xfrm>
+            <a:off x="1259549" y="1264749"/>
+            <a:ext cx="2800767" cy="369332"/>
+          </a:xfrm>
+          <a:prstGeom prst="rect">
+            <a:avLst/>
+          </a:prstGeom>
+        </p:spPr>
+        <p:txBody>
+          <a:bodyPr wrap="none">
+            <a:spAutoFit/>
+          </a:bodyPr>
+          <a:lstStyle/>
+          <a:p>
+            <a:r>
+              <a:rPr lang="en-US" dirty="0"/>
+              <a:t>Name=Interface Name</a:t>
+            </a:r>
+          </a:p>
+        </p:txBody>
+      </p:sp>
+      <p:sp>
+        <p:nvSpPr>
+          <p:cNvPr id="6" name="Rectangle 5">
+            <a:extLst>
+              <a:ext uri="{FF2B5EF4-FFF2-40B4-BE49-F238E27FC236}">
+                <a16:creationId xmlns:a16="http://schemas.microsoft.com/office/drawing/2014/main" id="{CC5B8FE4-11AC-42A8-A0C1-B6BD80C63C14}"/>
+              </a:ext>
+            </a:extLst>
+          </p:cNvPr>
+          <p:cNvSpPr/>
+          <p:nvPr/>
+        </p:nvSpPr>
+        <p:spPr>
+          <a:xfrm>
+            <a:off x="8953432" y="895417"/>
+            <a:ext cx="2170787" cy="369332"/>
+          </a:xfrm>
+          <a:prstGeom prst="rect">
+            <a:avLst/>
+          </a:prstGeom>
+        </p:spPr>
+        <p:txBody>
+          <a:bodyPr wrap="none">
+            <a:spAutoFit/>
+          </a:bodyPr>
+          <a:lstStyle/>
+          <a:p>
+            <a:r>
+              <a:rPr lang="en-US" dirty="0" err="1"/>
+              <a:t>HttpClientOptions</a:t>
+            </a:r>
+            <a:endParaRPr lang="en-US" dirty="0"/>
+          </a:p>
+        </p:txBody>
+      </p:sp>
+      <p:sp>
+        <p:nvSpPr>
+          <p:cNvPr id="8" name="Rectangle 7">
+            <a:extLst>
+              <a:ext uri="{FF2B5EF4-FFF2-40B4-BE49-F238E27FC236}">
+                <a16:creationId xmlns:a16="http://schemas.microsoft.com/office/drawing/2014/main" id="{6669469D-7B39-4664-A665-9E3DC3D43A2E}"/>
+              </a:ext>
+            </a:extLst>
+          </p:cNvPr>
+          <p:cNvSpPr/>
+          <p:nvPr/>
+        </p:nvSpPr>
+        <p:spPr>
+          <a:xfrm>
+            <a:off x="6495876" y="1449415"/>
+            <a:ext cx="5349380" cy="923330"/>
+          </a:xfrm>
+          <a:prstGeom prst="rect">
+            <a:avLst/>
+          </a:prstGeom>
+        </p:spPr>
+        <p:txBody>
+          <a:bodyPr wrap="square">
+            <a:spAutoFit/>
+          </a:bodyPr>
+          <a:lstStyle/>
+          <a:p>
+            <a:r>
+              <a:rPr lang="en-US" dirty="0"/>
+              <a:t>{ "</a:t>
+            </a:r>
+            <a:r>
+              <a:rPr lang="en-US" dirty="0" err="1"/>
+              <a:t>TestClient:BaseAddress</a:t>
+            </a:r>
+            <a:r>
+              <a:rPr lang="en-US" dirty="0"/>
+              <a:t>", "http://localhost" },                { "</a:t>
+            </a:r>
+            <a:r>
+              <a:rPr lang="en-US" dirty="0" err="1"/>
+              <a:t>TestClient:Timeout</a:t>
+            </a:r>
+            <a:r>
+              <a:rPr lang="en-US" dirty="0"/>
+              <a:t>", "00:05:00" },</a:t>
+            </a:r>
+          </a:p>
+          <a:p>
+            <a:r>
+              <a:rPr lang="en-US" dirty="0"/>
+              <a:t>{ "</a:t>
+            </a:r>
+            <a:r>
+              <a:rPr lang="en-US" dirty="0" err="1"/>
+              <a:t>TestClient:ContentType</a:t>
+            </a:r>
+            <a:r>
+              <a:rPr lang="en-US" dirty="0"/>
+              <a:t>", "application/json" }</a:t>
+            </a:r>
+          </a:p>
+        </p:txBody>
+      </p:sp>
     </p:spTree>
     <p:extLst>
       <p:ext uri="{BB962C8B-B14F-4D97-AF65-F5344CB8AC3E}">

</xml_diff>

<commit_message>
reworked the polly policy registration to be generic issue #1
</commit_message>
<xml_diff>
--- a/Bet.Extensions.Resilience.pptx
+++ b/Bet.Extensions.Resilience.pptx
@@ -8,6 +8,8 @@
     <p:sldId id="257" r:id="rId2"/>
     <p:sldId id="258" r:id="rId3"/>
     <p:sldId id="256" r:id="rId4"/>
+    <p:sldId id="259" r:id="rId5"/>
+    <p:sldId id="260" r:id="rId6"/>
   </p:sldIdLst>
   <p:sldSz cx="12192000" cy="6858000"/>
   <p:notesSz cx="6858000" cy="9144000"/>
@@ -317,7 +319,7 @@
             <a:fld id="{B61BEF0D-F0BB-DE4B-95CE-6DB70DBA9567}" type="datetimeFigureOut">
               <a:rPr lang="en-US" dirty="0"/>
               <a:pPr/>
-              <a:t>11/12/2019</a:t>
+              <a:t>11/15/2019</a:t>
             </a:fld>
             <a:endParaRPr lang="en-US" dirty="0"/>
           </a:p>
@@ -605,7 +607,7 @@
             <a:fld id="{B61BEF0D-F0BB-DE4B-95CE-6DB70DBA9567}" type="datetimeFigureOut">
               <a:rPr lang="en-US" dirty="0"/>
               <a:pPr/>
-              <a:t>11/12/2019</a:t>
+              <a:t>11/15/2019</a:t>
             </a:fld>
             <a:endParaRPr lang="en-US" dirty="0"/>
           </a:p>
@@ -850,7 +852,7 @@
             <a:fld id="{B61BEF0D-F0BB-DE4B-95CE-6DB70DBA9567}" type="datetimeFigureOut">
               <a:rPr lang="en-US" dirty="0"/>
               <a:pPr/>
-              <a:t>11/12/2019</a:t>
+              <a:t>11/15/2019</a:t>
             </a:fld>
             <a:endParaRPr lang="en-US" dirty="0"/>
           </a:p>
@@ -1383,7 +1385,7 @@
             <a:fld id="{B61BEF0D-F0BB-DE4B-95CE-6DB70DBA9567}" type="datetimeFigureOut">
               <a:rPr lang="en-US" dirty="0"/>
               <a:pPr/>
-              <a:t>11/12/2019</a:t>
+              <a:t>11/15/2019</a:t>
             </a:fld>
             <a:endParaRPr lang="en-US" dirty="0"/>
           </a:p>
@@ -1628,7 +1630,7 @@
             <a:fld id="{B61BEF0D-F0BB-DE4B-95CE-6DB70DBA9567}" type="datetimeFigureOut">
               <a:rPr lang="en-US" dirty="0"/>
               <a:pPr/>
-              <a:t>11/12/2019</a:t>
+              <a:t>11/15/2019</a:t>
             </a:fld>
             <a:endParaRPr lang="en-US" dirty="0"/>
           </a:p>
@@ -2168,7 +2170,7 @@
             <a:fld id="{B61BEF0D-F0BB-DE4B-95CE-6DB70DBA9567}" type="datetimeFigureOut">
               <a:rPr lang="en-US" dirty="0"/>
               <a:pPr/>
-              <a:t>11/12/2019</a:t>
+              <a:t>11/15/2019</a:t>
             </a:fld>
             <a:endParaRPr lang="en-US" dirty="0"/>
           </a:p>
@@ -2475,7 +2477,7 @@
             <a:fld id="{B61BEF0D-F0BB-DE4B-95CE-6DB70DBA9567}" type="datetimeFigureOut">
               <a:rPr lang="en-US" dirty="0"/>
               <a:pPr/>
-              <a:t>11/12/2019</a:t>
+              <a:t>11/15/2019</a:t>
             </a:fld>
             <a:endParaRPr lang="en-US" dirty="0"/>
           </a:p>
@@ -2647,7 +2649,7 @@
             <a:fld id="{B61BEF0D-F0BB-DE4B-95CE-6DB70DBA9567}" type="datetimeFigureOut">
               <a:rPr lang="en-US" dirty="0"/>
               <a:pPr/>
-              <a:t>11/12/2019</a:t>
+              <a:t>11/15/2019</a:t>
             </a:fld>
             <a:endParaRPr lang="en-US" dirty="0"/>
           </a:p>
@@ -2824,7 +2826,7 @@
             <a:fld id="{B61BEF0D-F0BB-DE4B-95CE-6DB70DBA9567}" type="datetimeFigureOut">
               <a:rPr lang="en-US" dirty="0"/>
               <a:pPr/>
-              <a:t>11/12/2019</a:t>
+              <a:t>11/15/2019</a:t>
             </a:fld>
             <a:endParaRPr lang="en-US" dirty="0"/>
           </a:p>
@@ -2991,7 +2993,7 @@
             <a:fld id="{B61BEF0D-F0BB-DE4B-95CE-6DB70DBA9567}" type="datetimeFigureOut">
               <a:rPr lang="en-US" dirty="0"/>
               <a:pPr/>
-              <a:t>11/12/2019</a:t>
+              <a:t>11/15/2019</a:t>
             </a:fld>
             <a:endParaRPr lang="en-US" dirty="0"/>
           </a:p>
@@ -3234,7 +3236,7 @@
             <a:fld id="{B61BEF0D-F0BB-DE4B-95CE-6DB70DBA9567}" type="datetimeFigureOut">
               <a:rPr lang="en-US" dirty="0"/>
               <a:pPr/>
-              <a:t>11/12/2019</a:t>
+              <a:t>11/15/2019</a:t>
             </a:fld>
             <a:endParaRPr lang="en-US" dirty="0"/>
           </a:p>
@@ -3523,7 +3525,7 @@
             <a:fld id="{B61BEF0D-F0BB-DE4B-95CE-6DB70DBA9567}" type="datetimeFigureOut">
               <a:rPr lang="en-US" dirty="0"/>
               <a:pPr/>
-              <a:t>11/12/2019</a:t>
+              <a:t>11/15/2019</a:t>
             </a:fld>
             <a:endParaRPr lang="en-US" dirty="0"/>
           </a:p>
@@ -3950,7 +3952,7 @@
             <a:fld id="{B61BEF0D-F0BB-DE4B-95CE-6DB70DBA9567}" type="datetimeFigureOut">
               <a:rPr lang="en-US" dirty="0"/>
               <a:pPr/>
-              <a:t>11/12/2019</a:t>
+              <a:t>11/15/2019</a:t>
             </a:fld>
             <a:endParaRPr lang="en-US" dirty="0"/>
           </a:p>
@@ -4070,7 +4072,7 @@
             <a:fld id="{B61BEF0D-F0BB-DE4B-95CE-6DB70DBA9567}" type="datetimeFigureOut">
               <a:rPr lang="en-US" dirty="0"/>
               <a:pPr/>
-              <a:t>11/12/2019</a:t>
+              <a:t>11/15/2019</a:t>
             </a:fld>
             <a:endParaRPr lang="en-US" dirty="0"/>
           </a:p>
@@ -4162,7 +4164,7 @@
             <a:fld id="{B61BEF0D-F0BB-DE4B-95CE-6DB70DBA9567}" type="datetimeFigureOut">
               <a:rPr lang="en-US" dirty="0"/>
               <a:pPr/>
-              <a:t>11/12/2019</a:t>
+              <a:t>11/15/2019</a:t>
             </a:fld>
             <a:endParaRPr lang="en-US" dirty="0"/>
           </a:p>
@@ -4442,7 +4444,7 @@
             <a:fld id="{B61BEF0D-F0BB-DE4B-95CE-6DB70DBA9567}" type="datetimeFigureOut">
               <a:rPr lang="en-US" dirty="0"/>
               <a:pPr/>
-              <a:t>11/12/2019</a:t>
+              <a:t>11/15/2019</a:t>
             </a:fld>
             <a:endParaRPr lang="en-US" dirty="0"/>
           </a:p>
@@ -4730,7 +4732,7 @@
             <a:fld id="{B61BEF0D-F0BB-DE4B-95CE-6DB70DBA9567}" type="datetimeFigureOut">
               <a:rPr lang="en-US" dirty="0"/>
               <a:pPr/>
-              <a:t>11/12/2019</a:t>
+              <a:t>11/15/2019</a:t>
             </a:fld>
             <a:endParaRPr lang="en-US" dirty="0"/>
           </a:p>
@@ -4958,7 +4960,7 @@
             <a:fld id="{B61BEF0D-F0BB-DE4B-95CE-6DB70DBA9567}" type="datetimeFigureOut">
               <a:rPr lang="en-US" dirty="0"/>
               <a:pPr/>
-              <a:t>11/12/2019</a:t>
+              <a:t>11/15/2019</a:t>
             </a:fld>
             <a:endParaRPr lang="en-US" dirty="0"/>
           </a:p>
@@ -6576,6 +6578,591 @@
 </p:sld>
 </file>
 
+<file path=ppt/slides/slide4.xml><?xml version="1.0" encoding="utf-8"?>
+<p:sld xmlns:a="http://schemas.openxmlformats.org/drawingml/2006/main" xmlns:r="http://schemas.openxmlformats.org/officeDocument/2006/relationships" xmlns:p="http://schemas.openxmlformats.org/presentationml/2006/main">
+  <p:cSld>
+    <p:spTree>
+      <p:nvGrpSpPr>
+        <p:cNvPr id="1" name=""/>
+        <p:cNvGrpSpPr/>
+        <p:nvPr/>
+      </p:nvGrpSpPr>
+      <p:grpSpPr>
+        <a:xfrm>
+          <a:off x="0" y="0"/>
+          <a:ext cx="0" cy="0"/>
+          <a:chOff x="0" y="0"/>
+          <a:chExt cx="0" cy="0"/>
+        </a:xfrm>
+      </p:grpSpPr>
+      <p:sp>
+        <p:nvSpPr>
+          <p:cNvPr id="4" name="TextBox 3">
+            <a:extLst>
+              <a:ext uri="{FF2B5EF4-FFF2-40B4-BE49-F238E27FC236}">
+                <a16:creationId xmlns:a16="http://schemas.microsoft.com/office/drawing/2014/main" id="{DAB0E43F-ACFD-4ACA-B810-AA6A62CEB094}"/>
+              </a:ext>
+            </a:extLst>
+          </p:cNvPr>
+          <p:cNvSpPr txBox="1"/>
+          <p:nvPr/>
+        </p:nvSpPr>
+        <p:spPr>
+          <a:xfrm>
+            <a:off x="1037441" y="2263633"/>
+            <a:ext cx="2855052" cy="369332"/>
+          </a:xfrm>
+          <a:prstGeom prst="rect">
+            <a:avLst/>
+          </a:prstGeom>
+          <a:noFill/>
+        </p:spPr>
+        <p:txBody>
+          <a:bodyPr wrap="square" rtlCol="0">
+            <a:spAutoFit/>
+          </a:bodyPr>
+          <a:lstStyle/>
+          <a:p>
+            <a:r>
+              <a:rPr lang="en-US" dirty="0" err="1"/>
+              <a:t>TimeoutPolicy</a:t>
+            </a:r>
+            <a:r>
+              <a:rPr lang="en-US" dirty="0"/>
+              <a:t> - Options</a:t>
+            </a:r>
+          </a:p>
+        </p:txBody>
+      </p:sp>
+      <p:sp>
+        <p:nvSpPr>
+          <p:cNvPr id="5" name="TextBox 4">
+            <a:extLst>
+              <a:ext uri="{FF2B5EF4-FFF2-40B4-BE49-F238E27FC236}">
+                <a16:creationId xmlns:a16="http://schemas.microsoft.com/office/drawing/2014/main" id="{B9BC5B9D-6C51-4074-A39D-8B1356ADED4C}"/>
+              </a:ext>
+            </a:extLst>
+          </p:cNvPr>
+          <p:cNvSpPr txBox="1"/>
+          <p:nvPr/>
+        </p:nvSpPr>
+        <p:spPr>
+          <a:xfrm>
+            <a:off x="373310" y="1083687"/>
+            <a:ext cx="4416803" cy="369332"/>
+          </a:xfrm>
+          <a:prstGeom prst="rect">
+            <a:avLst/>
+          </a:prstGeom>
+          <a:noFill/>
+        </p:spPr>
+        <p:txBody>
+          <a:bodyPr wrap="square" rtlCol="0">
+            <a:spAutoFit/>
+          </a:bodyPr>
+          <a:lstStyle/>
+          <a:p>
+            <a:r>
+              <a:rPr lang="en-US" dirty="0"/>
+              <a:t>Default Policy - Policy Options Section</a:t>
+            </a:r>
+          </a:p>
+        </p:txBody>
+      </p:sp>
+      <p:sp>
+        <p:nvSpPr>
+          <p:cNvPr id="6" name="TextBox 5">
+            <a:extLst>
+              <a:ext uri="{FF2B5EF4-FFF2-40B4-BE49-F238E27FC236}">
+                <a16:creationId xmlns:a16="http://schemas.microsoft.com/office/drawing/2014/main" id="{DEEDA8F7-D02A-43AE-91DE-A285F3454A6C}"/>
+              </a:ext>
+            </a:extLst>
+          </p:cNvPr>
+          <p:cNvSpPr txBox="1"/>
+          <p:nvPr/>
+        </p:nvSpPr>
+        <p:spPr>
+          <a:xfrm>
+            <a:off x="1037440" y="1858326"/>
+            <a:ext cx="2646727" cy="369332"/>
+          </a:xfrm>
+          <a:prstGeom prst="rect">
+            <a:avLst/>
+          </a:prstGeom>
+          <a:noFill/>
+        </p:spPr>
+        <p:txBody>
+          <a:bodyPr wrap="square" rtlCol="0">
+            <a:spAutoFit/>
+          </a:bodyPr>
+          <a:lstStyle/>
+          <a:p>
+            <a:r>
+              <a:rPr lang="en-US" dirty="0" err="1"/>
+              <a:t>RetryPolicy</a:t>
+            </a:r>
+            <a:r>
+              <a:rPr lang="en-US" dirty="0"/>
+              <a:t> - Options</a:t>
+            </a:r>
+          </a:p>
+        </p:txBody>
+      </p:sp>
+      <p:sp>
+        <p:nvSpPr>
+          <p:cNvPr id="14" name="Rectangle 13">
+            <a:extLst>
+              <a:ext uri="{FF2B5EF4-FFF2-40B4-BE49-F238E27FC236}">
+                <a16:creationId xmlns:a16="http://schemas.microsoft.com/office/drawing/2014/main" id="{F6DFCE42-8274-44B7-AE74-466B992CD794}"/>
+              </a:ext>
+            </a:extLst>
+          </p:cNvPr>
+          <p:cNvSpPr/>
+          <p:nvPr/>
+        </p:nvSpPr>
+        <p:spPr>
+          <a:xfrm>
+            <a:off x="5656976" y="1204675"/>
+            <a:ext cx="6087612" cy="3970318"/>
+          </a:xfrm>
+          <a:prstGeom prst="rect">
+            <a:avLst/>
+          </a:prstGeom>
+        </p:spPr>
+        <p:txBody>
+          <a:bodyPr wrap="square">
+            <a:spAutoFit/>
+          </a:bodyPr>
+          <a:lstStyle/>
+          <a:p>
+            <a:r>
+              <a:rPr lang="en-US" dirty="0"/>
+              <a:t> “</a:t>
+            </a:r>
+            <a:r>
+              <a:rPr lang="en-US" dirty="0" err="1"/>
+              <a:t>DefaultPolicy</a:t>
+            </a:r>
+            <a:r>
+              <a:rPr lang="en-US" dirty="0"/>
+              <a:t>": {</a:t>
+            </a:r>
+          </a:p>
+          <a:p>
+            <a:r>
+              <a:rPr lang="en-US" dirty="0"/>
+              <a:t>    "</a:t>
+            </a:r>
+            <a:r>
+              <a:rPr lang="en-US" dirty="0" err="1"/>
+              <a:t>CircuitBreaker</a:t>
+            </a:r>
+            <a:r>
+              <a:rPr lang="en-US" dirty="0"/>
+              <a:t>": {</a:t>
+            </a:r>
+          </a:p>
+          <a:p>
+            <a:r>
+              <a:rPr lang="en-US" dirty="0"/>
+              <a:t>      "</a:t>
+            </a:r>
+            <a:r>
+              <a:rPr lang="en-US" dirty="0" err="1"/>
+              <a:t>DurationOfBreak</a:t>
+            </a:r>
+            <a:r>
+              <a:rPr lang="en-US" dirty="0"/>
+              <a:t>": "00:00:10",</a:t>
+            </a:r>
+          </a:p>
+          <a:p>
+            <a:r>
+              <a:rPr lang="en-US" dirty="0"/>
+              <a:t>      "</a:t>
+            </a:r>
+            <a:r>
+              <a:rPr lang="en-US" dirty="0" err="1"/>
+              <a:t>ExceptionsAllowedBeforeBreaking</a:t>
+            </a:r>
+            <a:r>
+              <a:rPr lang="en-US" dirty="0"/>
+              <a:t>": 2</a:t>
+            </a:r>
+          </a:p>
+          <a:p>
+            <a:r>
+              <a:rPr lang="en-US" dirty="0"/>
+              <a:t>    },</a:t>
+            </a:r>
+          </a:p>
+          <a:p>
+            <a:r>
+              <a:rPr lang="en-US" dirty="0"/>
+              <a:t>    "Retry": {</a:t>
+            </a:r>
+          </a:p>
+          <a:p>
+            <a:r>
+              <a:rPr lang="en-US" dirty="0"/>
+              <a:t>      "</a:t>
+            </a:r>
+            <a:r>
+              <a:rPr lang="en-US" dirty="0" err="1"/>
+              <a:t>BackoffPower</a:t>
+            </a:r>
+            <a:r>
+              <a:rPr lang="en-US" dirty="0"/>
+              <a:t>": 2,</a:t>
+            </a:r>
+          </a:p>
+          <a:p>
+            <a:r>
+              <a:rPr lang="en-US" dirty="0"/>
+              <a:t>      "Count": 3</a:t>
+            </a:r>
+          </a:p>
+          <a:p>
+            <a:r>
+              <a:rPr lang="en-US" dirty="0"/>
+              <a:t>    },</a:t>
+            </a:r>
+          </a:p>
+          <a:p>
+            <a:endParaRPr lang="en-US" dirty="0"/>
+          </a:p>
+          <a:p>
+            <a:r>
+              <a:rPr lang="en-US" dirty="0"/>
+              <a:t>    "</a:t>
+            </a:r>
+            <a:r>
+              <a:rPr lang="en-US" dirty="0" err="1"/>
+              <a:t>RequestTimeout</a:t>
+            </a:r>
+            <a:r>
+              <a:rPr lang="en-US" dirty="0"/>
+              <a:t>": {</a:t>
+            </a:r>
+          </a:p>
+          <a:p>
+            <a:r>
+              <a:rPr lang="en-US" dirty="0"/>
+              <a:t>      "Timeout": "00:00:03"</a:t>
+            </a:r>
+          </a:p>
+          <a:p>
+            <a:r>
+              <a:rPr lang="en-US" dirty="0"/>
+              <a:t>    }</a:t>
+            </a:r>
+          </a:p>
+          <a:p>
+            <a:r>
+              <a:rPr lang="en-US" dirty="0"/>
+              <a:t>  }</a:t>
+            </a:r>
+          </a:p>
+        </p:txBody>
+      </p:sp>
+      <p:sp>
+        <p:nvSpPr>
+          <p:cNvPr id="15" name="Rectangle 14">
+            <a:extLst>
+              <a:ext uri="{FF2B5EF4-FFF2-40B4-BE49-F238E27FC236}">
+                <a16:creationId xmlns:a16="http://schemas.microsoft.com/office/drawing/2014/main" id="{628F4005-596A-4532-9BB2-0EC63A3BD612}"/>
+              </a:ext>
+            </a:extLst>
+          </p:cNvPr>
+          <p:cNvSpPr/>
+          <p:nvPr/>
+        </p:nvSpPr>
+        <p:spPr>
+          <a:xfrm>
+            <a:off x="1037440" y="1488994"/>
+            <a:ext cx="2400016" cy="369332"/>
+          </a:xfrm>
+          <a:prstGeom prst="rect">
+            <a:avLst/>
+          </a:prstGeom>
+        </p:spPr>
+        <p:txBody>
+          <a:bodyPr wrap="none">
+            <a:spAutoFit/>
+          </a:bodyPr>
+          <a:lstStyle/>
+          <a:p>
+            <a:r>
+              <a:rPr lang="en-US" dirty="0" err="1"/>
+              <a:t>CircuitBreakerPolicy</a:t>
+            </a:r>
+            <a:endParaRPr lang="en-US" dirty="0"/>
+          </a:p>
+        </p:txBody>
+      </p:sp>
+    </p:spTree>
+    <p:extLst>
+      <p:ext uri="{BB962C8B-B14F-4D97-AF65-F5344CB8AC3E}">
+        <p14:creationId xmlns:p14="http://schemas.microsoft.com/office/powerpoint/2010/main" val="3719812656"/>
+      </p:ext>
+    </p:extLst>
+  </p:cSld>
+  <p:clrMapOvr>
+    <a:masterClrMapping/>
+  </p:clrMapOvr>
+</p:sld>
+</file>
+
+<file path=ppt/slides/slide5.xml><?xml version="1.0" encoding="utf-8"?>
+<p:sld xmlns:a="http://schemas.openxmlformats.org/drawingml/2006/main" xmlns:r="http://schemas.openxmlformats.org/officeDocument/2006/relationships" xmlns:p="http://schemas.openxmlformats.org/presentationml/2006/main">
+  <p:cSld>
+    <p:spTree>
+      <p:nvGrpSpPr>
+        <p:cNvPr id="1" name=""/>
+        <p:cNvGrpSpPr/>
+        <p:nvPr/>
+      </p:nvGrpSpPr>
+      <p:grpSpPr>
+        <a:xfrm>
+          <a:off x="0" y="0"/>
+          <a:ext cx="0" cy="0"/>
+          <a:chOff x="0" y="0"/>
+          <a:chExt cx="0" cy="0"/>
+        </a:xfrm>
+      </p:grpSpPr>
+      <p:sp>
+        <p:nvSpPr>
+          <p:cNvPr id="4" name="TextBox 3">
+            <a:extLst>
+              <a:ext uri="{FF2B5EF4-FFF2-40B4-BE49-F238E27FC236}">
+                <a16:creationId xmlns:a16="http://schemas.microsoft.com/office/drawing/2014/main" id="{DAB0E43F-ACFD-4ACA-B810-AA6A62CEB094}"/>
+              </a:ext>
+            </a:extLst>
+          </p:cNvPr>
+          <p:cNvSpPr txBox="1"/>
+          <p:nvPr/>
+        </p:nvSpPr>
+        <p:spPr>
+          <a:xfrm>
+            <a:off x="517321" y="3150339"/>
+            <a:ext cx="3906473" cy="369332"/>
+          </a:xfrm>
+          <a:prstGeom prst="rect">
+            <a:avLst/>
+          </a:prstGeom>
+          <a:noFill/>
+        </p:spPr>
+        <p:txBody>
+          <a:bodyPr wrap="square" rtlCol="0">
+            <a:spAutoFit/>
+          </a:bodyPr>
+          <a:lstStyle/>
+          <a:p>
+            <a:r>
+              <a:rPr lang="en-US" dirty="0" err="1"/>
+              <a:t>HttpTimeoutPolicy</a:t>
+            </a:r>
+            <a:r>
+              <a:rPr lang="en-US" dirty="0"/>
+              <a:t> Policy Options</a:t>
+            </a:r>
+          </a:p>
+        </p:txBody>
+      </p:sp>
+      <p:sp>
+        <p:nvSpPr>
+          <p:cNvPr id="5" name="TextBox 4">
+            <a:extLst>
+              <a:ext uri="{FF2B5EF4-FFF2-40B4-BE49-F238E27FC236}">
+                <a16:creationId xmlns:a16="http://schemas.microsoft.com/office/drawing/2014/main" id="{B9BC5B9D-6C51-4074-A39D-8B1356ADED4C}"/>
+              </a:ext>
+            </a:extLst>
+          </p:cNvPr>
+          <p:cNvSpPr txBox="1"/>
+          <p:nvPr/>
+        </p:nvSpPr>
+        <p:spPr>
+          <a:xfrm>
+            <a:off x="373311" y="2031643"/>
+            <a:ext cx="2097247" cy="369332"/>
+          </a:xfrm>
+          <a:prstGeom prst="rect">
+            <a:avLst/>
+          </a:prstGeom>
+          <a:noFill/>
+        </p:spPr>
+        <p:txBody>
+          <a:bodyPr wrap="square" rtlCol="0">
+            <a:spAutoFit/>
+          </a:bodyPr>
+          <a:lstStyle/>
+          <a:p>
+            <a:r>
+              <a:rPr lang="en-US" dirty="0"/>
+              <a:t>Policy Options</a:t>
+            </a:r>
+          </a:p>
+        </p:txBody>
+      </p:sp>
+      <p:sp>
+        <p:nvSpPr>
+          <p:cNvPr id="6" name="TextBox 5">
+            <a:extLst>
+              <a:ext uri="{FF2B5EF4-FFF2-40B4-BE49-F238E27FC236}">
+                <a16:creationId xmlns:a16="http://schemas.microsoft.com/office/drawing/2014/main" id="{DEEDA8F7-D02A-43AE-91DE-A285F3454A6C}"/>
+              </a:ext>
+            </a:extLst>
+          </p:cNvPr>
+          <p:cNvSpPr txBox="1"/>
+          <p:nvPr/>
+        </p:nvSpPr>
+        <p:spPr>
+          <a:xfrm>
+            <a:off x="517321" y="2590991"/>
+            <a:ext cx="2097247" cy="369332"/>
+          </a:xfrm>
+          <a:prstGeom prst="rect">
+            <a:avLst/>
+          </a:prstGeom>
+          <a:noFill/>
+        </p:spPr>
+        <p:txBody>
+          <a:bodyPr wrap="square" rtlCol="0">
+            <a:spAutoFit/>
+          </a:bodyPr>
+          <a:lstStyle/>
+          <a:p>
+            <a:r>
+              <a:rPr lang="en-US" dirty="0"/>
+              <a:t>Policy Options</a:t>
+            </a:r>
+          </a:p>
+        </p:txBody>
+      </p:sp>
+      <p:sp>
+        <p:nvSpPr>
+          <p:cNvPr id="7" name="TextBox 6">
+            <a:extLst>
+              <a:ext uri="{FF2B5EF4-FFF2-40B4-BE49-F238E27FC236}">
+                <a16:creationId xmlns:a16="http://schemas.microsoft.com/office/drawing/2014/main" id="{C62958F4-FF84-4F26-8136-8561FFACB3A5}"/>
+              </a:ext>
+            </a:extLst>
+          </p:cNvPr>
+          <p:cNvSpPr txBox="1"/>
+          <p:nvPr/>
+        </p:nvSpPr>
+        <p:spPr>
+          <a:xfrm>
+            <a:off x="8697988" y="1672099"/>
+            <a:ext cx="2653720" cy="369332"/>
+          </a:xfrm>
+          <a:prstGeom prst="rect">
+            <a:avLst/>
+          </a:prstGeom>
+          <a:noFill/>
+        </p:spPr>
+        <p:txBody>
+          <a:bodyPr wrap="square" rtlCol="0">
+            <a:spAutoFit/>
+          </a:bodyPr>
+          <a:lstStyle/>
+          <a:p>
+            <a:r>
+              <a:rPr lang="en-US" dirty="0" err="1"/>
+              <a:t>HttpClient</a:t>
+            </a:r>
+            <a:r>
+              <a:rPr lang="en-US" dirty="0"/>
+              <a:t> Options</a:t>
+            </a:r>
+          </a:p>
+        </p:txBody>
+      </p:sp>
+      <p:sp>
+        <p:nvSpPr>
+          <p:cNvPr id="8" name="TextBox 7">
+            <a:extLst>
+              <a:ext uri="{FF2B5EF4-FFF2-40B4-BE49-F238E27FC236}">
+                <a16:creationId xmlns:a16="http://schemas.microsoft.com/office/drawing/2014/main" id="{6FE4BB14-43B7-485E-87FA-4EFE7C36748F}"/>
+              </a:ext>
+            </a:extLst>
+          </p:cNvPr>
+          <p:cNvSpPr txBox="1"/>
+          <p:nvPr/>
+        </p:nvSpPr>
+        <p:spPr>
+          <a:xfrm>
+            <a:off x="4639113" y="1846977"/>
+            <a:ext cx="2097247" cy="369332"/>
+          </a:xfrm>
+          <a:prstGeom prst="rect">
+            <a:avLst/>
+          </a:prstGeom>
+          <a:noFill/>
+        </p:spPr>
+        <p:txBody>
+          <a:bodyPr wrap="square" rtlCol="0">
+            <a:spAutoFit/>
+          </a:bodyPr>
+          <a:lstStyle/>
+          <a:p>
+            <a:r>
+              <a:rPr lang="en-US" dirty="0" err="1"/>
+              <a:t>HttpClient</a:t>
+            </a:r>
+            <a:endParaRPr lang="en-US" dirty="0"/>
+          </a:p>
+        </p:txBody>
+      </p:sp>
+      <p:sp>
+        <p:nvSpPr>
+          <p:cNvPr id="9" name="TextBox 8">
+            <a:extLst>
+              <a:ext uri="{FF2B5EF4-FFF2-40B4-BE49-F238E27FC236}">
+                <a16:creationId xmlns:a16="http://schemas.microsoft.com/office/drawing/2014/main" id="{CE9F0A69-AA02-4CA3-AC51-C289056736A6}"/>
+              </a:ext>
+            </a:extLst>
+          </p:cNvPr>
+          <p:cNvSpPr txBox="1"/>
+          <p:nvPr/>
+        </p:nvSpPr>
+        <p:spPr>
+          <a:xfrm>
+            <a:off x="5181600" y="2240452"/>
+            <a:ext cx="2611772" cy="369332"/>
+          </a:xfrm>
+          <a:prstGeom prst="rect">
+            <a:avLst/>
+          </a:prstGeom>
+          <a:noFill/>
+        </p:spPr>
+        <p:txBody>
+          <a:bodyPr wrap="square" rtlCol="0">
+            <a:spAutoFit/>
+          </a:bodyPr>
+          <a:lstStyle/>
+          <a:p>
+            <a:r>
+              <a:rPr lang="en-US" dirty="0" err="1"/>
+              <a:t>DelegatingHandler</a:t>
+            </a:r>
+            <a:endParaRPr lang="en-US" dirty="0"/>
+          </a:p>
+        </p:txBody>
+      </p:sp>
+    </p:spTree>
+    <p:extLst>
+      <p:ext uri="{BB962C8B-B14F-4D97-AF65-F5344CB8AC3E}">
+        <p14:creationId xmlns:p14="http://schemas.microsoft.com/office/powerpoint/2010/main" val="129308691"/>
+      </p:ext>
+    </p:extLst>
+  </p:cSld>
+  <p:clrMapOvr>
+    <a:masterClrMapping/>
+  </p:clrMapOvr>
+</p:sld>
+</file>
+
 <file path=ppt/theme/theme1.xml><?xml version="1.0" encoding="utf-8"?>
 <a:theme xmlns:a="http://schemas.openxmlformats.org/drawingml/2006/main" name="Mesh">
   <a:themeElements>

</xml_diff>

<commit_message>
fix before the update
</commit_message>
<xml_diff>
--- a/Bet.Extensions.Resilience.pptx
+++ b/Bet.Extensions.Resilience.pptx
@@ -319,7 +319,7 @@
             <a:fld id="{B61BEF0D-F0BB-DE4B-95CE-6DB70DBA9567}" type="datetimeFigureOut">
               <a:rPr lang="en-US" dirty="0"/>
               <a:pPr/>
-              <a:t>11/15/2019</a:t>
+              <a:t>11/25/2019</a:t>
             </a:fld>
             <a:endParaRPr lang="en-US" dirty="0"/>
           </a:p>
@@ -607,7 +607,7 @@
             <a:fld id="{B61BEF0D-F0BB-DE4B-95CE-6DB70DBA9567}" type="datetimeFigureOut">
               <a:rPr lang="en-US" dirty="0"/>
               <a:pPr/>
-              <a:t>11/15/2019</a:t>
+              <a:t>11/25/2019</a:t>
             </a:fld>
             <a:endParaRPr lang="en-US" dirty="0"/>
           </a:p>
@@ -852,7 +852,7 @@
             <a:fld id="{B61BEF0D-F0BB-DE4B-95CE-6DB70DBA9567}" type="datetimeFigureOut">
               <a:rPr lang="en-US" dirty="0"/>
               <a:pPr/>
-              <a:t>11/15/2019</a:t>
+              <a:t>11/25/2019</a:t>
             </a:fld>
             <a:endParaRPr lang="en-US" dirty="0"/>
           </a:p>
@@ -1385,7 +1385,7 @@
             <a:fld id="{B61BEF0D-F0BB-DE4B-95CE-6DB70DBA9567}" type="datetimeFigureOut">
               <a:rPr lang="en-US" dirty="0"/>
               <a:pPr/>
-              <a:t>11/15/2019</a:t>
+              <a:t>11/25/2019</a:t>
             </a:fld>
             <a:endParaRPr lang="en-US" dirty="0"/>
           </a:p>
@@ -1630,7 +1630,7 @@
             <a:fld id="{B61BEF0D-F0BB-DE4B-95CE-6DB70DBA9567}" type="datetimeFigureOut">
               <a:rPr lang="en-US" dirty="0"/>
               <a:pPr/>
-              <a:t>11/15/2019</a:t>
+              <a:t>11/25/2019</a:t>
             </a:fld>
             <a:endParaRPr lang="en-US" dirty="0"/>
           </a:p>
@@ -2170,7 +2170,7 @@
             <a:fld id="{B61BEF0D-F0BB-DE4B-95CE-6DB70DBA9567}" type="datetimeFigureOut">
               <a:rPr lang="en-US" dirty="0"/>
               <a:pPr/>
-              <a:t>11/15/2019</a:t>
+              <a:t>11/25/2019</a:t>
             </a:fld>
             <a:endParaRPr lang="en-US" dirty="0"/>
           </a:p>
@@ -2477,7 +2477,7 @@
             <a:fld id="{B61BEF0D-F0BB-DE4B-95CE-6DB70DBA9567}" type="datetimeFigureOut">
               <a:rPr lang="en-US" dirty="0"/>
               <a:pPr/>
-              <a:t>11/15/2019</a:t>
+              <a:t>11/25/2019</a:t>
             </a:fld>
             <a:endParaRPr lang="en-US" dirty="0"/>
           </a:p>
@@ -2649,7 +2649,7 @@
             <a:fld id="{B61BEF0D-F0BB-DE4B-95CE-6DB70DBA9567}" type="datetimeFigureOut">
               <a:rPr lang="en-US" dirty="0"/>
               <a:pPr/>
-              <a:t>11/15/2019</a:t>
+              <a:t>11/25/2019</a:t>
             </a:fld>
             <a:endParaRPr lang="en-US" dirty="0"/>
           </a:p>
@@ -2826,7 +2826,7 @@
             <a:fld id="{B61BEF0D-F0BB-DE4B-95CE-6DB70DBA9567}" type="datetimeFigureOut">
               <a:rPr lang="en-US" dirty="0"/>
               <a:pPr/>
-              <a:t>11/15/2019</a:t>
+              <a:t>11/25/2019</a:t>
             </a:fld>
             <a:endParaRPr lang="en-US" dirty="0"/>
           </a:p>
@@ -2993,7 +2993,7 @@
             <a:fld id="{B61BEF0D-F0BB-DE4B-95CE-6DB70DBA9567}" type="datetimeFigureOut">
               <a:rPr lang="en-US" dirty="0"/>
               <a:pPr/>
-              <a:t>11/15/2019</a:t>
+              <a:t>11/25/2019</a:t>
             </a:fld>
             <a:endParaRPr lang="en-US" dirty="0"/>
           </a:p>
@@ -3236,7 +3236,7 @@
             <a:fld id="{B61BEF0D-F0BB-DE4B-95CE-6DB70DBA9567}" type="datetimeFigureOut">
               <a:rPr lang="en-US" dirty="0"/>
               <a:pPr/>
-              <a:t>11/15/2019</a:t>
+              <a:t>11/25/2019</a:t>
             </a:fld>
             <a:endParaRPr lang="en-US" dirty="0"/>
           </a:p>
@@ -3525,7 +3525,7 @@
             <a:fld id="{B61BEF0D-F0BB-DE4B-95CE-6DB70DBA9567}" type="datetimeFigureOut">
               <a:rPr lang="en-US" dirty="0"/>
               <a:pPr/>
-              <a:t>11/15/2019</a:t>
+              <a:t>11/25/2019</a:t>
             </a:fld>
             <a:endParaRPr lang="en-US" dirty="0"/>
           </a:p>
@@ -3952,7 +3952,7 @@
             <a:fld id="{B61BEF0D-F0BB-DE4B-95CE-6DB70DBA9567}" type="datetimeFigureOut">
               <a:rPr lang="en-US" dirty="0"/>
               <a:pPr/>
-              <a:t>11/15/2019</a:t>
+              <a:t>11/25/2019</a:t>
             </a:fld>
             <a:endParaRPr lang="en-US" dirty="0"/>
           </a:p>
@@ -4072,7 +4072,7 @@
             <a:fld id="{B61BEF0D-F0BB-DE4B-95CE-6DB70DBA9567}" type="datetimeFigureOut">
               <a:rPr lang="en-US" dirty="0"/>
               <a:pPr/>
-              <a:t>11/15/2019</a:t>
+              <a:t>11/25/2019</a:t>
             </a:fld>
             <a:endParaRPr lang="en-US" dirty="0"/>
           </a:p>
@@ -4164,7 +4164,7 @@
             <a:fld id="{B61BEF0D-F0BB-DE4B-95CE-6DB70DBA9567}" type="datetimeFigureOut">
               <a:rPr lang="en-US" dirty="0"/>
               <a:pPr/>
-              <a:t>11/15/2019</a:t>
+              <a:t>11/25/2019</a:t>
             </a:fld>
             <a:endParaRPr lang="en-US" dirty="0"/>
           </a:p>
@@ -4444,7 +4444,7 @@
             <a:fld id="{B61BEF0D-F0BB-DE4B-95CE-6DB70DBA9567}" type="datetimeFigureOut">
               <a:rPr lang="en-US" dirty="0"/>
               <a:pPr/>
-              <a:t>11/15/2019</a:t>
+              <a:t>11/25/2019</a:t>
             </a:fld>
             <a:endParaRPr lang="en-US" dirty="0"/>
           </a:p>
@@ -4732,7 +4732,7 @@
             <a:fld id="{B61BEF0D-F0BB-DE4B-95CE-6DB70DBA9567}" type="datetimeFigureOut">
               <a:rPr lang="en-US" dirty="0"/>
               <a:pPr/>
-              <a:t>11/15/2019</a:t>
+              <a:t>11/25/2019</a:t>
             </a:fld>
             <a:endParaRPr lang="en-US" dirty="0"/>
           </a:p>
@@ -4960,7 +4960,7 @@
             <a:fld id="{B61BEF0D-F0BB-DE4B-95CE-6DB70DBA9567}" type="datetimeFigureOut">
               <a:rPr lang="en-US" dirty="0"/>
               <a:pPr/>
-              <a:t>11/15/2019</a:t>
+              <a:t>11/25/2019</a:t>
             </a:fld>
             <a:endParaRPr lang="en-US" dirty="0"/>
           </a:p>
@@ -5665,6 +5665,38 @@
           <a:bodyPr/>
           <a:lstStyle/>
           <a:p>
+            <a:r>
+              <a:rPr lang="en-US" dirty="0"/>
+              <a:t>Ease of configuration</a:t>
+            </a:r>
+          </a:p>
+          <a:p>
+            <a:r>
+              <a:rPr lang="en-US" dirty="0"/>
+              <a:t>Default </a:t>
+            </a:r>
+            <a:r>
+              <a:rPr lang="en-US" dirty="0" err="1"/>
+              <a:t>polly</a:t>
+            </a:r>
+            <a:r>
+              <a:rPr lang="en-US" dirty="0"/>
+              <a:t> policies</a:t>
+            </a:r>
+          </a:p>
+          <a:p>
+            <a:r>
+              <a:rPr lang="en-US" dirty="0"/>
+              <a:t>DI and </a:t>
+            </a:r>
+            <a:r>
+              <a:rPr lang="en-US" dirty="0" err="1"/>
+              <a:t>PolicyRegistry</a:t>
+            </a:r>
+            <a:r>
+              <a:rPr lang="en-US"/>
+              <a:t> Instances</a:t>
+            </a:r>
             <a:endParaRPr lang="en-US" dirty="0"/>
           </a:p>
         </p:txBody>

</xml_diff>

<commit_message>
update docuementation issue #1
</commit_message>
<xml_diff>
--- a/Bet.Extensions.Resilience.pptx
+++ b/Bet.Extensions.Resilience.pptx
@@ -6,10 +6,10 @@
   </p:sldMasterIdLst>
   <p:sldIdLst>
     <p:sldId id="257" r:id="rId2"/>
-    <p:sldId id="258" r:id="rId3"/>
-    <p:sldId id="256" r:id="rId4"/>
-    <p:sldId id="259" r:id="rId5"/>
-    <p:sldId id="260" r:id="rId6"/>
+    <p:sldId id="261" r:id="rId3"/>
+    <p:sldId id="258" r:id="rId4"/>
+    <p:sldId id="256" r:id="rId5"/>
+    <p:sldId id="259" r:id="rId6"/>
   </p:sldIdLst>
   <p:sldSz cx="12192000" cy="6858000"/>
   <p:notesSz cx="6858000" cy="9144000"/>
@@ -319,7 +319,7 @@
             <a:fld id="{B61BEF0D-F0BB-DE4B-95CE-6DB70DBA9567}" type="datetimeFigureOut">
               <a:rPr lang="en-US" dirty="0"/>
               <a:pPr/>
-              <a:t>11/25/2019</a:t>
+              <a:t>12/5/2019</a:t>
             </a:fld>
             <a:endParaRPr lang="en-US" dirty="0"/>
           </a:p>
@@ -607,7 +607,7 @@
             <a:fld id="{B61BEF0D-F0BB-DE4B-95CE-6DB70DBA9567}" type="datetimeFigureOut">
               <a:rPr lang="en-US" dirty="0"/>
               <a:pPr/>
-              <a:t>11/25/2019</a:t>
+              <a:t>12/5/2019</a:t>
             </a:fld>
             <a:endParaRPr lang="en-US" dirty="0"/>
           </a:p>
@@ -852,7 +852,7 @@
             <a:fld id="{B61BEF0D-F0BB-DE4B-95CE-6DB70DBA9567}" type="datetimeFigureOut">
               <a:rPr lang="en-US" dirty="0"/>
               <a:pPr/>
-              <a:t>11/25/2019</a:t>
+              <a:t>12/5/2019</a:t>
             </a:fld>
             <a:endParaRPr lang="en-US" dirty="0"/>
           </a:p>
@@ -1385,7 +1385,7 @@
             <a:fld id="{B61BEF0D-F0BB-DE4B-95CE-6DB70DBA9567}" type="datetimeFigureOut">
               <a:rPr lang="en-US" dirty="0"/>
               <a:pPr/>
-              <a:t>11/25/2019</a:t>
+              <a:t>12/5/2019</a:t>
             </a:fld>
             <a:endParaRPr lang="en-US" dirty="0"/>
           </a:p>
@@ -1630,7 +1630,7 @@
             <a:fld id="{B61BEF0D-F0BB-DE4B-95CE-6DB70DBA9567}" type="datetimeFigureOut">
               <a:rPr lang="en-US" dirty="0"/>
               <a:pPr/>
-              <a:t>11/25/2019</a:t>
+              <a:t>12/5/2019</a:t>
             </a:fld>
             <a:endParaRPr lang="en-US" dirty="0"/>
           </a:p>
@@ -2170,7 +2170,7 @@
             <a:fld id="{B61BEF0D-F0BB-DE4B-95CE-6DB70DBA9567}" type="datetimeFigureOut">
               <a:rPr lang="en-US" dirty="0"/>
               <a:pPr/>
-              <a:t>11/25/2019</a:t>
+              <a:t>12/5/2019</a:t>
             </a:fld>
             <a:endParaRPr lang="en-US" dirty="0"/>
           </a:p>
@@ -2477,7 +2477,7 @@
             <a:fld id="{B61BEF0D-F0BB-DE4B-95CE-6DB70DBA9567}" type="datetimeFigureOut">
               <a:rPr lang="en-US" dirty="0"/>
               <a:pPr/>
-              <a:t>11/25/2019</a:t>
+              <a:t>12/5/2019</a:t>
             </a:fld>
             <a:endParaRPr lang="en-US" dirty="0"/>
           </a:p>
@@ -2649,7 +2649,7 @@
             <a:fld id="{B61BEF0D-F0BB-DE4B-95CE-6DB70DBA9567}" type="datetimeFigureOut">
               <a:rPr lang="en-US" dirty="0"/>
               <a:pPr/>
-              <a:t>11/25/2019</a:t>
+              <a:t>12/5/2019</a:t>
             </a:fld>
             <a:endParaRPr lang="en-US" dirty="0"/>
           </a:p>
@@ -2826,7 +2826,7 @@
             <a:fld id="{B61BEF0D-F0BB-DE4B-95CE-6DB70DBA9567}" type="datetimeFigureOut">
               <a:rPr lang="en-US" dirty="0"/>
               <a:pPr/>
-              <a:t>11/25/2019</a:t>
+              <a:t>12/5/2019</a:t>
             </a:fld>
             <a:endParaRPr lang="en-US" dirty="0"/>
           </a:p>
@@ -2993,7 +2993,7 @@
             <a:fld id="{B61BEF0D-F0BB-DE4B-95CE-6DB70DBA9567}" type="datetimeFigureOut">
               <a:rPr lang="en-US" dirty="0"/>
               <a:pPr/>
-              <a:t>11/25/2019</a:t>
+              <a:t>12/5/2019</a:t>
             </a:fld>
             <a:endParaRPr lang="en-US" dirty="0"/>
           </a:p>
@@ -3236,7 +3236,7 @@
             <a:fld id="{B61BEF0D-F0BB-DE4B-95CE-6DB70DBA9567}" type="datetimeFigureOut">
               <a:rPr lang="en-US" dirty="0"/>
               <a:pPr/>
-              <a:t>11/25/2019</a:t>
+              <a:t>12/5/2019</a:t>
             </a:fld>
             <a:endParaRPr lang="en-US" dirty="0"/>
           </a:p>
@@ -3525,7 +3525,7 @@
             <a:fld id="{B61BEF0D-F0BB-DE4B-95CE-6DB70DBA9567}" type="datetimeFigureOut">
               <a:rPr lang="en-US" dirty="0"/>
               <a:pPr/>
-              <a:t>11/25/2019</a:t>
+              <a:t>12/5/2019</a:t>
             </a:fld>
             <a:endParaRPr lang="en-US" dirty="0"/>
           </a:p>
@@ -3952,7 +3952,7 @@
             <a:fld id="{B61BEF0D-F0BB-DE4B-95CE-6DB70DBA9567}" type="datetimeFigureOut">
               <a:rPr lang="en-US" dirty="0"/>
               <a:pPr/>
-              <a:t>11/25/2019</a:t>
+              <a:t>12/5/2019</a:t>
             </a:fld>
             <a:endParaRPr lang="en-US" dirty="0"/>
           </a:p>
@@ -4072,7 +4072,7 @@
             <a:fld id="{B61BEF0D-F0BB-DE4B-95CE-6DB70DBA9567}" type="datetimeFigureOut">
               <a:rPr lang="en-US" dirty="0"/>
               <a:pPr/>
-              <a:t>11/25/2019</a:t>
+              <a:t>12/5/2019</a:t>
             </a:fld>
             <a:endParaRPr lang="en-US" dirty="0"/>
           </a:p>
@@ -4164,7 +4164,7 @@
             <a:fld id="{B61BEF0D-F0BB-DE4B-95CE-6DB70DBA9567}" type="datetimeFigureOut">
               <a:rPr lang="en-US" dirty="0"/>
               <a:pPr/>
-              <a:t>11/25/2019</a:t>
+              <a:t>12/5/2019</a:t>
             </a:fld>
             <a:endParaRPr lang="en-US" dirty="0"/>
           </a:p>
@@ -4444,7 +4444,7 @@
             <a:fld id="{B61BEF0D-F0BB-DE4B-95CE-6DB70DBA9567}" type="datetimeFigureOut">
               <a:rPr lang="en-US" dirty="0"/>
               <a:pPr/>
-              <a:t>11/25/2019</a:t>
+              <a:t>12/5/2019</a:t>
             </a:fld>
             <a:endParaRPr lang="en-US" dirty="0"/>
           </a:p>
@@ -4732,7 +4732,7 @@
             <a:fld id="{B61BEF0D-F0BB-DE4B-95CE-6DB70DBA9567}" type="datetimeFigureOut">
               <a:rPr lang="en-US" dirty="0"/>
               <a:pPr/>
-              <a:t>11/25/2019</a:t>
+              <a:t>12/5/2019</a:t>
             </a:fld>
             <a:endParaRPr lang="en-US" dirty="0"/>
           </a:p>
@@ -4960,7 +4960,7 @@
             <a:fld id="{B61BEF0D-F0BB-DE4B-95CE-6DB70DBA9567}" type="datetimeFigureOut">
               <a:rPr lang="en-US" dirty="0"/>
               <a:pPr/>
-              <a:t>11/25/2019</a:t>
+              <a:t>12/5/2019</a:t>
             </a:fld>
             <a:endParaRPr lang="en-US" dirty="0"/>
           </a:p>
@@ -5681,7 +5681,7 @@
             </a:r>
             <a:r>
               <a:rPr lang="en-US" dirty="0"/>
-              <a:t> policies</a:t>
+              <a:t> Shapes (Policies)</a:t>
             </a:r>
           </a:p>
           <a:p>
@@ -5691,13 +5691,12 @@
             </a:r>
             <a:r>
               <a:rPr lang="en-US" dirty="0" err="1"/>
-              <a:t>PolicyRegistry</a:t>
-            </a:r>
-            <a:r>
-              <a:rPr lang="en-US"/>
-              <a:t> Instances</a:t>
-            </a:r>
-            <a:endParaRPr lang="en-US" dirty="0"/>
+              <a:t>IPolicyRegistry</a:t>
+            </a:r>
+            <a:r>
+              <a:rPr lang="en-US" dirty="0"/>
+              <a:t>&lt;string&gt; Instances Registrations</a:t>
+            </a:r>
           </a:p>
         </p:txBody>
       </p:sp>
@@ -5733,10 +5732,44 @@
       </p:grpSpPr>
       <p:sp>
         <p:nvSpPr>
-          <p:cNvPr id="4" name="Rectangle 3">
+          <p:cNvPr id="2" name="Title 1">
             <a:extLst>
               <a:ext uri="{FF2B5EF4-FFF2-40B4-BE49-F238E27FC236}">
-                <a16:creationId xmlns:a16="http://schemas.microsoft.com/office/drawing/2014/main" id="{65101ED6-2A6F-412A-A147-F42F0E113992}"/>
+                <a16:creationId xmlns:a16="http://schemas.microsoft.com/office/drawing/2014/main" id="{FEB3F372-6D5F-4B81-A79F-B86986AEC658}"/>
+              </a:ext>
+            </a:extLst>
+          </p:cNvPr>
+          <p:cNvSpPr>
+            <a:spLocks noGrp="1"/>
+          </p:cNvSpPr>
+          <p:nvPr>
+            <p:ph type="title"/>
+          </p:nvPr>
+        </p:nvSpPr>
+        <p:spPr>
+          <a:xfrm>
+            <a:off x="1007189" y="173373"/>
+            <a:ext cx="9905998" cy="1905000"/>
+          </a:xfrm>
+        </p:spPr>
+        <p:txBody>
+          <a:bodyPr/>
+          <a:lstStyle/>
+          <a:p>
+            <a:r>
+              <a:rPr lang="en-US" dirty="0" err="1"/>
+              <a:t>Bet.Extensions.Resilience.Abstractions</a:t>
+            </a:r>
+            <a:endParaRPr lang="en-US" dirty="0"/>
+          </a:p>
+        </p:txBody>
+      </p:sp>
+      <p:sp>
+        <p:nvSpPr>
+          <p:cNvPr id="6" name="Rectangle 5">
+            <a:extLst>
+              <a:ext uri="{FF2B5EF4-FFF2-40B4-BE49-F238E27FC236}">
+                <a16:creationId xmlns:a16="http://schemas.microsoft.com/office/drawing/2014/main" id="{42DAD050-F65E-4CDF-B8AB-945B8B42FA33}"/>
               </a:ext>
             </a:extLst>
           </p:cNvPr>
@@ -5745,33 +5778,67 @@
         </p:nvSpPr>
         <p:spPr>
           <a:xfrm>
-            <a:off x="479372" y="895417"/>
-            <a:ext cx="3163045" cy="369332"/>
+            <a:off x="3323788" y="2402397"/>
+            <a:ext cx="4102216" cy="1189140"/>
           </a:xfrm>
           <a:prstGeom prst="rect">
             <a:avLst/>
           </a:prstGeom>
         </p:spPr>
-        <p:txBody>
-          <a:bodyPr wrap="none">
-            <a:spAutoFit/>
-          </a:bodyPr>
-          <a:lstStyle/>
-          <a:p>
+        <p:style>
+          <a:lnRef idx="2">
+            <a:schemeClr val="accent1">
+              <a:shade val="50000"/>
+            </a:schemeClr>
+          </a:lnRef>
+          <a:fillRef idx="1">
+            <a:schemeClr val="accent1"/>
+          </a:fillRef>
+          <a:effectRef idx="0">
+            <a:schemeClr val="accent1"/>
+          </a:effectRef>
+          <a:fontRef idx="minor">
+            <a:schemeClr val="lt1"/>
+          </a:fontRef>
+        </p:style>
+        <p:txBody>
+          <a:bodyPr rtlCol="0" anchor="ctr"/>
+          <a:lstStyle/>
+          <a:p>
+            <a:pPr algn="ctr"/>
             <a:r>
               <a:rPr lang="en-US" dirty="0" err="1"/>
-              <a:t>ResilienceHttpClientBuilder</a:t>
-            </a:r>
-            <a:endParaRPr lang="en-US" dirty="0"/>
-          </a:p>
-        </p:txBody>
-      </p:sp>
-      <p:sp>
-        <p:nvSpPr>
-          <p:cNvPr id="5" name="Rectangle 4">
+              <a:t>PolicyBucket</a:t>
+            </a:r>
+            <a:r>
+              <a:rPr lang="en-US" dirty="0"/>
+              <a:t>&lt;</a:t>
+            </a:r>
+            <a:r>
+              <a:rPr lang="en-US" dirty="0" err="1"/>
+              <a:t>TPolicy</a:t>
+            </a:r>
+            <a:r>
+              <a:rPr lang="en-US" dirty="0"/>
+              <a:t>, </a:t>
+            </a:r>
+            <a:r>
+              <a:rPr lang="en-US" dirty="0" err="1"/>
+              <a:t>TOptions</a:t>
+            </a:r>
+            <a:r>
+              <a:rPr lang="en-US" dirty="0"/>
+              <a:t>&gt;</a:t>
+            </a:r>
+          </a:p>
+        </p:txBody>
+      </p:sp>
+      <p:sp>
+        <p:nvSpPr>
+          <p:cNvPr id="7" name="Rectangle 6">
             <a:extLst>
               <a:ext uri="{FF2B5EF4-FFF2-40B4-BE49-F238E27FC236}">
-                <a16:creationId xmlns:a16="http://schemas.microsoft.com/office/drawing/2014/main" id="{3FADF21D-3A69-43BC-9994-DF454CB02575}"/>
+                <a16:creationId xmlns:a16="http://schemas.microsoft.com/office/drawing/2014/main" id="{BE4EB7C9-3CF3-4E91-9A85-3D89A74B9D9E}"/>
               </a:ext>
             </a:extLst>
           </p:cNvPr>
@@ -5780,32 +5847,48 @@
         </p:nvSpPr>
         <p:spPr>
           <a:xfrm>
-            <a:off x="1259549" y="1264749"/>
-            <a:ext cx="2800767" cy="369332"/>
+            <a:off x="336258" y="1668711"/>
+            <a:ext cx="2758580" cy="1003532"/>
           </a:xfrm>
           <a:prstGeom prst="rect">
             <a:avLst/>
           </a:prstGeom>
         </p:spPr>
-        <p:txBody>
-          <a:bodyPr wrap="none">
-            <a:spAutoFit/>
-          </a:bodyPr>
-          <a:lstStyle/>
-          <a:p>
-            <a:r>
-              <a:rPr lang="en-US" dirty="0"/>
-              <a:t>Name=Interface Name</a:t>
-            </a:r>
-          </a:p>
-        </p:txBody>
-      </p:sp>
-      <p:sp>
-        <p:nvSpPr>
-          <p:cNvPr id="6" name="Rectangle 5">
+        <p:style>
+          <a:lnRef idx="2">
+            <a:schemeClr val="accent1">
+              <a:shade val="50000"/>
+            </a:schemeClr>
+          </a:lnRef>
+          <a:fillRef idx="1">
+            <a:schemeClr val="accent1"/>
+          </a:fillRef>
+          <a:effectRef idx="0">
+            <a:schemeClr val="accent1"/>
+          </a:effectRef>
+          <a:fontRef idx="minor">
+            <a:schemeClr val="lt1"/>
+          </a:fontRef>
+        </p:style>
+        <p:txBody>
+          <a:bodyPr rtlCol="0" anchor="ctr"/>
+          <a:lstStyle/>
+          <a:p>
+            <a:pPr algn="ctr"/>
+            <a:r>
+              <a:rPr lang="en-US" dirty="0" err="1"/>
+              <a:t>TimeoutPolicyOptions</a:t>
+            </a:r>
+            <a:endParaRPr lang="en-US" dirty="0"/>
+          </a:p>
+        </p:txBody>
+      </p:sp>
+      <p:sp>
+        <p:nvSpPr>
+          <p:cNvPr id="8" name="Rectangle 7">
             <a:extLst>
               <a:ext uri="{FF2B5EF4-FFF2-40B4-BE49-F238E27FC236}">
-                <a16:creationId xmlns:a16="http://schemas.microsoft.com/office/drawing/2014/main" id="{CC5B8FE4-11AC-42A8-A0C1-B6BD80C63C14}"/>
+                <a16:creationId xmlns:a16="http://schemas.microsoft.com/office/drawing/2014/main" id="{A5E63E3C-ACD7-409F-956E-E56D9C0B9339}"/>
               </a:ext>
             </a:extLst>
           </p:cNvPr>
@@ -5814,33 +5897,67 @@
         </p:nvSpPr>
         <p:spPr>
           <a:xfrm>
-            <a:off x="8953432" y="895417"/>
-            <a:ext cx="2170787" cy="369332"/>
+            <a:off x="7643769" y="1746134"/>
+            <a:ext cx="4102216" cy="1038837"/>
           </a:xfrm>
           <a:prstGeom prst="rect">
             <a:avLst/>
           </a:prstGeom>
         </p:spPr>
-        <p:txBody>
-          <a:bodyPr wrap="none">
-            <a:spAutoFit/>
-          </a:bodyPr>
-          <a:lstStyle/>
-          <a:p>
+        <p:style>
+          <a:lnRef idx="2">
+            <a:schemeClr val="accent1">
+              <a:shade val="50000"/>
+            </a:schemeClr>
+          </a:lnRef>
+          <a:fillRef idx="1">
+            <a:schemeClr val="accent1"/>
+          </a:fillRef>
+          <a:effectRef idx="0">
+            <a:schemeClr val="accent1"/>
+          </a:effectRef>
+          <a:fontRef idx="minor">
+            <a:schemeClr val="lt1"/>
+          </a:fontRef>
+        </p:style>
+        <p:txBody>
+          <a:bodyPr rtlCol="0" anchor="ctr"/>
+          <a:lstStyle/>
+          <a:p>
+            <a:pPr algn="ctr"/>
             <a:r>
               <a:rPr lang="en-US" dirty="0" err="1"/>
-              <a:t>HttpClientOptions</a:t>
-            </a:r>
-            <a:endParaRPr lang="en-US" dirty="0"/>
-          </a:p>
-        </p:txBody>
-      </p:sp>
-      <p:sp>
-        <p:nvSpPr>
-          <p:cNvPr id="8" name="Rectangle 7">
+              <a:t>PolicyLoader</a:t>
+            </a:r>
+            <a:r>
+              <a:rPr lang="en-US" dirty="0"/>
+              <a:t>&lt;</a:t>
+            </a:r>
+            <a:r>
+              <a:rPr lang="en-US" dirty="0" err="1"/>
+              <a:t>TPolicy</a:t>
+            </a:r>
+            <a:r>
+              <a:rPr lang="en-US" dirty="0"/>
+              <a:t>, </a:t>
+            </a:r>
+            <a:r>
+              <a:rPr lang="en-US" dirty="0" err="1"/>
+              <a:t>TOptions</a:t>
+            </a:r>
+            <a:r>
+              <a:rPr lang="en-US" dirty="0"/>
+              <a:t>&gt;</a:t>
+            </a:r>
+          </a:p>
+        </p:txBody>
+      </p:sp>
+      <p:sp>
+        <p:nvSpPr>
+          <p:cNvPr id="10" name="Rectangle 9">
             <a:extLst>
               <a:ext uri="{FF2B5EF4-FFF2-40B4-BE49-F238E27FC236}">
-                <a16:creationId xmlns:a16="http://schemas.microsoft.com/office/drawing/2014/main" id="{6669469D-7B39-4664-A665-9E3DC3D43A2E}"/>
+                <a16:creationId xmlns:a16="http://schemas.microsoft.com/office/drawing/2014/main" id="{DF3A4C39-2B1B-4F1C-BD03-18DA960A519B}"/>
               </a:ext>
             </a:extLst>
           </p:cNvPr>
@@ -5849,52 +5966,210 @@
         </p:nvSpPr>
         <p:spPr>
           <a:xfrm>
-            <a:off x="6495876" y="1449415"/>
-            <a:ext cx="5349380" cy="923330"/>
+            <a:off x="7643769" y="3649387"/>
+            <a:ext cx="4102216" cy="1038837"/>
           </a:xfrm>
           <a:prstGeom prst="rect">
             <a:avLst/>
           </a:prstGeom>
         </p:spPr>
-        <p:txBody>
-          <a:bodyPr wrap="square">
-            <a:spAutoFit/>
-          </a:bodyPr>
-          <a:lstStyle/>
-          <a:p>
-            <a:r>
-              <a:rPr lang="en-US" dirty="0"/>
-              <a:t>{ "</a:t>
-            </a:r>
+        <p:style>
+          <a:lnRef idx="2">
+            <a:schemeClr val="accent1">
+              <a:shade val="50000"/>
+            </a:schemeClr>
+          </a:lnRef>
+          <a:fillRef idx="1">
+            <a:schemeClr val="accent1"/>
+          </a:fillRef>
+          <a:effectRef idx="0">
+            <a:schemeClr val="accent1"/>
+          </a:effectRef>
+          <a:fontRef idx="minor">
+            <a:schemeClr val="lt1"/>
+          </a:fontRef>
+        </p:style>
+        <p:txBody>
+          <a:bodyPr rtlCol="0" anchor="ctr"/>
+          <a:lstStyle/>
+          <a:p>
+            <a:pPr algn="ctr"/>
             <a:r>
               <a:rPr lang="en-US" dirty="0" err="1"/>
-              <a:t>TestClient:BaseAddress</a:t>
-            </a:r>
-            <a:r>
-              <a:rPr lang="en-US" dirty="0"/>
-              <a:t>", "http://localhost" },                { "</a:t>
+              <a:t>PolicyLoader</a:t>
+            </a:r>
+            <a:r>
+              <a:rPr lang="en-US" dirty="0"/>
+              <a:t>&lt;</a:t>
             </a:r>
             <a:r>
               <a:rPr lang="en-US" dirty="0" err="1"/>
-              <a:t>TestClient:Timeout</a:t>
-            </a:r>
-            <a:r>
-              <a:rPr lang="en-US" dirty="0"/>
-              <a:t>", "00:05:00" },</a:t>
-            </a:r>
-          </a:p>
-          <a:p>
-            <a:r>
-              <a:rPr lang="en-US" dirty="0"/>
-              <a:t>{ "</a:t>
+              <a:t>TPolicy</a:t>
+            </a:r>
+            <a:r>
+              <a:rPr lang="en-US" dirty="0"/>
+              <a:t>, </a:t>
             </a:r>
             <a:r>
               <a:rPr lang="en-US" dirty="0" err="1"/>
-              <a:t>TestClient:ContentType</a:t>
-            </a:r>
-            <a:r>
-              <a:rPr lang="en-US" dirty="0"/>
-              <a:t>", "application/json" }</a:t>
+              <a:t>TOptions</a:t>
+            </a:r>
+            <a:r>
+              <a:rPr lang="en-US" dirty="0"/>
+              <a:t>&gt;</a:t>
+            </a:r>
+          </a:p>
+        </p:txBody>
+      </p:sp>
+      <p:sp>
+        <p:nvSpPr>
+          <p:cNvPr id="11" name="Rectangle 10">
+            <a:extLst>
+              <a:ext uri="{FF2B5EF4-FFF2-40B4-BE49-F238E27FC236}">
+                <a16:creationId xmlns:a16="http://schemas.microsoft.com/office/drawing/2014/main" id="{3DEDD5A5-8EF8-450C-A5E8-7A59FEBA4977}"/>
+              </a:ext>
+            </a:extLst>
+          </p:cNvPr>
+          <p:cNvSpPr/>
+          <p:nvPr/>
+        </p:nvSpPr>
+        <p:spPr>
+          <a:xfrm>
+            <a:off x="336258" y="3755821"/>
+            <a:ext cx="2758580" cy="1003532"/>
+          </a:xfrm>
+          <a:prstGeom prst="rect">
+            <a:avLst/>
+          </a:prstGeom>
+        </p:spPr>
+        <p:style>
+          <a:lnRef idx="2">
+            <a:schemeClr val="accent1">
+              <a:shade val="50000"/>
+            </a:schemeClr>
+          </a:lnRef>
+          <a:fillRef idx="1">
+            <a:schemeClr val="accent1"/>
+          </a:fillRef>
+          <a:effectRef idx="0">
+            <a:schemeClr val="accent1"/>
+          </a:effectRef>
+          <a:fontRef idx="minor">
+            <a:schemeClr val="lt1"/>
+          </a:fontRef>
+        </p:style>
+        <p:txBody>
+          <a:bodyPr rtlCol="0" anchor="ctr"/>
+          <a:lstStyle/>
+          <a:p>
+            <a:pPr algn="ctr"/>
+            <a:r>
+              <a:rPr lang="en-US" dirty="0" err="1"/>
+              <a:t>TimeoutPolicyOptions</a:t>
+            </a:r>
+            <a:endParaRPr lang="en-US" dirty="0"/>
+          </a:p>
+        </p:txBody>
+      </p:sp>
+      <p:sp>
+        <p:nvSpPr>
+          <p:cNvPr id="12" name="Cylinder 11">
+            <a:extLst>
+              <a:ext uri="{FF2B5EF4-FFF2-40B4-BE49-F238E27FC236}">
+                <a16:creationId xmlns:a16="http://schemas.microsoft.com/office/drawing/2014/main" id="{B7D4ECD2-FD28-4B7E-B20E-ADA4C515BD23}"/>
+              </a:ext>
+            </a:extLst>
+          </p:cNvPr>
+          <p:cNvSpPr/>
+          <p:nvPr/>
+        </p:nvSpPr>
+        <p:spPr>
+          <a:xfrm>
+            <a:off x="574644" y="5273179"/>
+            <a:ext cx="2281807" cy="1139504"/>
+          </a:xfrm>
+          <a:prstGeom prst="can">
+            <a:avLst/>
+          </a:prstGeom>
+        </p:spPr>
+        <p:style>
+          <a:lnRef idx="2">
+            <a:schemeClr val="accent1">
+              <a:shade val="50000"/>
+            </a:schemeClr>
+          </a:lnRef>
+          <a:fillRef idx="1">
+            <a:schemeClr val="accent1"/>
+          </a:fillRef>
+          <a:effectRef idx="0">
+            <a:schemeClr val="accent1"/>
+          </a:effectRef>
+          <a:fontRef idx="minor">
+            <a:schemeClr val="lt1"/>
+          </a:fontRef>
+        </p:style>
+        <p:txBody>
+          <a:bodyPr rtlCol="0" anchor="ctr"/>
+          <a:lstStyle/>
+          <a:p>
+            <a:pPr algn="ctr"/>
+            <a:r>
+              <a:rPr lang="en-US" dirty="0" err="1"/>
+              <a:t>IConfiguration</a:t>
+            </a:r>
+            <a:endParaRPr lang="en-US" dirty="0"/>
+          </a:p>
+        </p:txBody>
+      </p:sp>
+      <p:sp>
+        <p:nvSpPr>
+          <p:cNvPr id="13" name="Cylinder 12">
+            <a:extLst>
+              <a:ext uri="{FF2B5EF4-FFF2-40B4-BE49-F238E27FC236}">
+                <a16:creationId xmlns:a16="http://schemas.microsoft.com/office/drawing/2014/main" id="{347E4DF5-C1F6-4AB5-AE6D-1AFBE9455024}"/>
+              </a:ext>
+            </a:extLst>
+          </p:cNvPr>
+          <p:cNvSpPr/>
+          <p:nvPr/>
+        </p:nvSpPr>
+        <p:spPr>
+          <a:xfrm>
+            <a:off x="8474978" y="5410900"/>
+            <a:ext cx="2811710" cy="1139504"/>
+          </a:xfrm>
+          <a:prstGeom prst="can">
+            <a:avLst/>
+          </a:prstGeom>
+        </p:spPr>
+        <p:style>
+          <a:lnRef idx="2">
+            <a:schemeClr val="accent1">
+              <a:shade val="50000"/>
+            </a:schemeClr>
+          </a:lnRef>
+          <a:fillRef idx="1">
+            <a:schemeClr val="accent1"/>
+          </a:fillRef>
+          <a:effectRef idx="0">
+            <a:schemeClr val="accent1"/>
+          </a:effectRef>
+          <a:fontRef idx="minor">
+            <a:schemeClr val="lt1"/>
+          </a:fontRef>
+        </p:style>
+        <p:txBody>
+          <a:bodyPr rtlCol="0" anchor="ctr"/>
+          <a:lstStyle/>
+          <a:p>
+            <a:pPr algn="ctr"/>
+            <a:r>
+              <a:rPr lang="en-US" dirty="0" err="1"/>
+              <a:t>IPolicyRegistry</a:t>
+            </a:r>
+            <a:r>
+              <a:rPr lang="en-US" dirty="0"/>
+              <a:t>&lt;string&gt; </a:t>
             </a:r>
           </a:p>
         </p:txBody>
@@ -5902,7 +6177,7 @@
     </p:spTree>
     <p:extLst>
       <p:ext uri="{BB962C8B-B14F-4D97-AF65-F5344CB8AC3E}">
-        <p14:creationId xmlns:p14="http://schemas.microsoft.com/office/powerpoint/2010/main" val="4189412955"/>
+        <p14:creationId xmlns:p14="http://schemas.microsoft.com/office/powerpoint/2010/main" val="378181661"/>
       </p:ext>
     </p:extLst>
   </p:cSld>
@@ -5931,6 +6206,204 @@
       </p:grpSpPr>
       <p:sp>
         <p:nvSpPr>
+          <p:cNvPr id="4" name="Rectangle 3">
+            <a:extLst>
+              <a:ext uri="{FF2B5EF4-FFF2-40B4-BE49-F238E27FC236}">
+                <a16:creationId xmlns:a16="http://schemas.microsoft.com/office/drawing/2014/main" id="{65101ED6-2A6F-412A-A147-F42F0E113992}"/>
+              </a:ext>
+            </a:extLst>
+          </p:cNvPr>
+          <p:cNvSpPr/>
+          <p:nvPr/>
+        </p:nvSpPr>
+        <p:spPr>
+          <a:xfrm>
+            <a:off x="479372" y="895417"/>
+            <a:ext cx="3163045" cy="369332"/>
+          </a:xfrm>
+          <a:prstGeom prst="rect">
+            <a:avLst/>
+          </a:prstGeom>
+        </p:spPr>
+        <p:txBody>
+          <a:bodyPr wrap="none">
+            <a:spAutoFit/>
+          </a:bodyPr>
+          <a:lstStyle/>
+          <a:p>
+            <a:r>
+              <a:rPr lang="en-US" dirty="0" err="1"/>
+              <a:t>ResilienceHttpClientBuilder</a:t>
+            </a:r>
+            <a:endParaRPr lang="en-US" dirty="0"/>
+          </a:p>
+        </p:txBody>
+      </p:sp>
+      <p:sp>
+        <p:nvSpPr>
+          <p:cNvPr id="5" name="Rectangle 4">
+            <a:extLst>
+              <a:ext uri="{FF2B5EF4-FFF2-40B4-BE49-F238E27FC236}">
+                <a16:creationId xmlns:a16="http://schemas.microsoft.com/office/drawing/2014/main" id="{3FADF21D-3A69-43BC-9994-DF454CB02575}"/>
+              </a:ext>
+            </a:extLst>
+          </p:cNvPr>
+          <p:cNvSpPr/>
+          <p:nvPr/>
+        </p:nvSpPr>
+        <p:spPr>
+          <a:xfrm>
+            <a:off x="1259549" y="1264749"/>
+            <a:ext cx="2800767" cy="369332"/>
+          </a:xfrm>
+          <a:prstGeom prst="rect">
+            <a:avLst/>
+          </a:prstGeom>
+        </p:spPr>
+        <p:txBody>
+          <a:bodyPr wrap="none">
+            <a:spAutoFit/>
+          </a:bodyPr>
+          <a:lstStyle/>
+          <a:p>
+            <a:r>
+              <a:rPr lang="en-US" dirty="0"/>
+              <a:t>Name=Interface Name</a:t>
+            </a:r>
+          </a:p>
+        </p:txBody>
+      </p:sp>
+      <p:sp>
+        <p:nvSpPr>
+          <p:cNvPr id="6" name="Rectangle 5">
+            <a:extLst>
+              <a:ext uri="{FF2B5EF4-FFF2-40B4-BE49-F238E27FC236}">
+                <a16:creationId xmlns:a16="http://schemas.microsoft.com/office/drawing/2014/main" id="{CC5B8FE4-11AC-42A8-A0C1-B6BD80C63C14}"/>
+              </a:ext>
+            </a:extLst>
+          </p:cNvPr>
+          <p:cNvSpPr/>
+          <p:nvPr/>
+        </p:nvSpPr>
+        <p:spPr>
+          <a:xfrm>
+            <a:off x="8953432" y="895417"/>
+            <a:ext cx="2170787" cy="369332"/>
+          </a:xfrm>
+          <a:prstGeom prst="rect">
+            <a:avLst/>
+          </a:prstGeom>
+        </p:spPr>
+        <p:txBody>
+          <a:bodyPr wrap="none">
+            <a:spAutoFit/>
+          </a:bodyPr>
+          <a:lstStyle/>
+          <a:p>
+            <a:r>
+              <a:rPr lang="en-US" dirty="0" err="1"/>
+              <a:t>HttpClientOptions</a:t>
+            </a:r>
+            <a:endParaRPr lang="en-US" dirty="0"/>
+          </a:p>
+        </p:txBody>
+      </p:sp>
+      <p:sp>
+        <p:nvSpPr>
+          <p:cNvPr id="8" name="Rectangle 7">
+            <a:extLst>
+              <a:ext uri="{FF2B5EF4-FFF2-40B4-BE49-F238E27FC236}">
+                <a16:creationId xmlns:a16="http://schemas.microsoft.com/office/drawing/2014/main" id="{6669469D-7B39-4664-A665-9E3DC3D43A2E}"/>
+              </a:ext>
+            </a:extLst>
+          </p:cNvPr>
+          <p:cNvSpPr/>
+          <p:nvPr/>
+        </p:nvSpPr>
+        <p:spPr>
+          <a:xfrm>
+            <a:off x="6495876" y="1449415"/>
+            <a:ext cx="5349380" cy="923330"/>
+          </a:xfrm>
+          <a:prstGeom prst="rect">
+            <a:avLst/>
+          </a:prstGeom>
+        </p:spPr>
+        <p:txBody>
+          <a:bodyPr wrap="square">
+            <a:spAutoFit/>
+          </a:bodyPr>
+          <a:lstStyle/>
+          <a:p>
+            <a:r>
+              <a:rPr lang="en-US" dirty="0"/>
+              <a:t>{ "</a:t>
+            </a:r>
+            <a:r>
+              <a:rPr lang="en-US" dirty="0" err="1"/>
+              <a:t>TestClient:BaseAddress</a:t>
+            </a:r>
+            <a:r>
+              <a:rPr lang="en-US" dirty="0"/>
+              <a:t>", "http://localhost" },                { "</a:t>
+            </a:r>
+            <a:r>
+              <a:rPr lang="en-US" dirty="0" err="1"/>
+              <a:t>TestClient:Timeout</a:t>
+            </a:r>
+            <a:r>
+              <a:rPr lang="en-US" dirty="0"/>
+              <a:t>", "00:05:00" },</a:t>
+            </a:r>
+          </a:p>
+          <a:p>
+            <a:r>
+              <a:rPr lang="en-US" dirty="0"/>
+              <a:t>{ "</a:t>
+            </a:r>
+            <a:r>
+              <a:rPr lang="en-US" dirty="0" err="1"/>
+              <a:t>TestClient:ContentType</a:t>
+            </a:r>
+            <a:r>
+              <a:rPr lang="en-US" dirty="0"/>
+              <a:t>", "application/json" }</a:t>
+            </a:r>
+          </a:p>
+        </p:txBody>
+      </p:sp>
+    </p:spTree>
+    <p:extLst>
+      <p:ext uri="{BB962C8B-B14F-4D97-AF65-F5344CB8AC3E}">
+        <p14:creationId xmlns:p14="http://schemas.microsoft.com/office/powerpoint/2010/main" val="4189412955"/>
+      </p:ext>
+    </p:extLst>
+  </p:cSld>
+  <p:clrMapOvr>
+    <a:masterClrMapping/>
+  </p:clrMapOvr>
+</p:sld>
+</file>
+
+<file path=ppt/slides/slide4.xml><?xml version="1.0" encoding="utf-8"?>
+<p:sld xmlns:a="http://schemas.openxmlformats.org/drawingml/2006/main" xmlns:r="http://schemas.openxmlformats.org/officeDocument/2006/relationships" xmlns:p="http://schemas.openxmlformats.org/presentationml/2006/main">
+  <p:cSld>
+    <p:spTree>
+      <p:nvGrpSpPr>
+        <p:cNvPr id="1" name=""/>
+        <p:cNvGrpSpPr/>
+        <p:nvPr/>
+      </p:nvGrpSpPr>
+      <p:grpSpPr>
+        <a:xfrm>
+          <a:off x="0" y="0"/>
+          <a:ext cx="0" cy="0"/>
+          <a:chOff x="0" y="0"/>
+          <a:chExt cx="0" cy="0"/>
+        </a:xfrm>
+      </p:grpSpPr>
+      <p:sp>
+        <p:nvSpPr>
           <p:cNvPr id="4" name="TextBox 3">
             <a:extLst>
               <a:ext uri="{FF2B5EF4-FFF2-40B4-BE49-F238E27FC236}">
@@ -6005,53 +6478,6 @@
       </p:sp>
       <p:sp>
         <p:nvSpPr>
-          <p:cNvPr id="6" name="TextBox 5">
-            <a:extLst>
-              <a:ext uri="{FF2B5EF4-FFF2-40B4-BE49-F238E27FC236}">
-                <a16:creationId xmlns:a16="http://schemas.microsoft.com/office/drawing/2014/main" id="{172D6EEA-0929-4FA4-A0EF-E890202E7D51}"/>
-              </a:ext>
-            </a:extLst>
-          </p:cNvPr>
-          <p:cNvSpPr txBox="1"/>
-          <p:nvPr/>
-        </p:nvSpPr>
-        <p:spPr>
-          <a:xfrm>
-            <a:off x="2244234" y="763329"/>
-            <a:ext cx="3137482" cy="369332"/>
-          </a:xfrm>
-          <a:prstGeom prst="rect">
-            <a:avLst/>
-          </a:prstGeom>
-          <a:noFill/>
-        </p:spPr>
-        <p:txBody>
-          <a:bodyPr wrap="square" rtlCol="0">
-            <a:spAutoFit/>
-          </a:bodyPr>
-          <a:lstStyle/>
-          <a:p>
-            <a:r>
-              <a:rPr lang="en-US" dirty="0" err="1">
-                <a:solidFill>
-                  <a:srgbClr val="FFFF00"/>
-                </a:solidFill>
-              </a:rPr>
-              <a:t>IPolicyRegistry</a:t>
-            </a:r>
-            <a:r>
-              <a:rPr lang="en-US" dirty="0">
-                <a:solidFill>
-                  <a:srgbClr val="FFFF00"/>
-                </a:solidFill>
-              </a:rPr>
-              <a:t>&lt;{T}&gt;</a:t>
-            </a:r>
-          </a:p>
-        </p:txBody>
-      </p:sp>
-      <p:sp>
-        <p:nvSpPr>
           <p:cNvPr id="7" name="TextBox 6">
             <a:extLst>
               <a:ext uri="{FF2B5EF4-FFF2-40B4-BE49-F238E27FC236}">
@@ -6187,41 +6613,6 @@
               <a:rPr lang="en-US" dirty="0"/>
               <a:t>Section Name</a:t>
             </a:r>
-          </a:p>
-        </p:txBody>
-      </p:sp>
-      <p:sp>
-        <p:nvSpPr>
-          <p:cNvPr id="2" name="Rectangle 1">
-            <a:extLst>
-              <a:ext uri="{FF2B5EF4-FFF2-40B4-BE49-F238E27FC236}">
-                <a16:creationId xmlns:a16="http://schemas.microsoft.com/office/drawing/2014/main" id="{EEAA0B96-9764-44D7-B7B2-49CE2A14950E}"/>
-              </a:ext>
-            </a:extLst>
-          </p:cNvPr>
-          <p:cNvSpPr/>
-          <p:nvPr/>
-        </p:nvSpPr>
-        <p:spPr>
-          <a:xfrm>
-            <a:off x="2244234" y="1163329"/>
-            <a:ext cx="2172390" cy="369332"/>
-          </a:xfrm>
-          <a:prstGeom prst="rect">
-            <a:avLst/>
-          </a:prstGeom>
-        </p:spPr>
-        <p:txBody>
-          <a:bodyPr wrap="none">
-            <a:spAutoFit/>
-          </a:bodyPr>
-          <a:lstStyle/>
-          <a:p>
-            <a:r>
-              <a:rPr lang="en-US" dirty="0" err="1"/>
-              <a:t>HttpPolicyOptions</a:t>
-            </a:r>
-            <a:endParaRPr lang="en-US" dirty="0"/>
           </a:p>
         </p:txBody>
       </p:sp>
@@ -6610,341 +7001,6 @@
 </p:sld>
 </file>
 
-<file path=ppt/slides/slide4.xml><?xml version="1.0" encoding="utf-8"?>
-<p:sld xmlns:a="http://schemas.openxmlformats.org/drawingml/2006/main" xmlns:r="http://schemas.openxmlformats.org/officeDocument/2006/relationships" xmlns:p="http://schemas.openxmlformats.org/presentationml/2006/main">
-  <p:cSld>
-    <p:spTree>
-      <p:nvGrpSpPr>
-        <p:cNvPr id="1" name=""/>
-        <p:cNvGrpSpPr/>
-        <p:nvPr/>
-      </p:nvGrpSpPr>
-      <p:grpSpPr>
-        <a:xfrm>
-          <a:off x="0" y="0"/>
-          <a:ext cx="0" cy="0"/>
-          <a:chOff x="0" y="0"/>
-          <a:chExt cx="0" cy="0"/>
-        </a:xfrm>
-      </p:grpSpPr>
-      <p:sp>
-        <p:nvSpPr>
-          <p:cNvPr id="4" name="TextBox 3">
-            <a:extLst>
-              <a:ext uri="{FF2B5EF4-FFF2-40B4-BE49-F238E27FC236}">
-                <a16:creationId xmlns:a16="http://schemas.microsoft.com/office/drawing/2014/main" id="{DAB0E43F-ACFD-4ACA-B810-AA6A62CEB094}"/>
-              </a:ext>
-            </a:extLst>
-          </p:cNvPr>
-          <p:cNvSpPr txBox="1"/>
-          <p:nvPr/>
-        </p:nvSpPr>
-        <p:spPr>
-          <a:xfrm>
-            <a:off x="1037441" y="2263633"/>
-            <a:ext cx="2855052" cy="369332"/>
-          </a:xfrm>
-          <a:prstGeom prst="rect">
-            <a:avLst/>
-          </a:prstGeom>
-          <a:noFill/>
-        </p:spPr>
-        <p:txBody>
-          <a:bodyPr wrap="square" rtlCol="0">
-            <a:spAutoFit/>
-          </a:bodyPr>
-          <a:lstStyle/>
-          <a:p>
-            <a:r>
-              <a:rPr lang="en-US" dirty="0" err="1"/>
-              <a:t>TimeoutPolicy</a:t>
-            </a:r>
-            <a:r>
-              <a:rPr lang="en-US" dirty="0"/>
-              <a:t> - Options</a:t>
-            </a:r>
-          </a:p>
-        </p:txBody>
-      </p:sp>
-      <p:sp>
-        <p:nvSpPr>
-          <p:cNvPr id="5" name="TextBox 4">
-            <a:extLst>
-              <a:ext uri="{FF2B5EF4-FFF2-40B4-BE49-F238E27FC236}">
-                <a16:creationId xmlns:a16="http://schemas.microsoft.com/office/drawing/2014/main" id="{B9BC5B9D-6C51-4074-A39D-8B1356ADED4C}"/>
-              </a:ext>
-            </a:extLst>
-          </p:cNvPr>
-          <p:cNvSpPr txBox="1"/>
-          <p:nvPr/>
-        </p:nvSpPr>
-        <p:spPr>
-          <a:xfrm>
-            <a:off x="373310" y="1083687"/>
-            <a:ext cx="4416803" cy="369332"/>
-          </a:xfrm>
-          <a:prstGeom prst="rect">
-            <a:avLst/>
-          </a:prstGeom>
-          <a:noFill/>
-        </p:spPr>
-        <p:txBody>
-          <a:bodyPr wrap="square" rtlCol="0">
-            <a:spAutoFit/>
-          </a:bodyPr>
-          <a:lstStyle/>
-          <a:p>
-            <a:r>
-              <a:rPr lang="en-US" dirty="0"/>
-              <a:t>Default Policy - Policy Options Section</a:t>
-            </a:r>
-          </a:p>
-        </p:txBody>
-      </p:sp>
-      <p:sp>
-        <p:nvSpPr>
-          <p:cNvPr id="6" name="TextBox 5">
-            <a:extLst>
-              <a:ext uri="{FF2B5EF4-FFF2-40B4-BE49-F238E27FC236}">
-                <a16:creationId xmlns:a16="http://schemas.microsoft.com/office/drawing/2014/main" id="{DEEDA8F7-D02A-43AE-91DE-A285F3454A6C}"/>
-              </a:ext>
-            </a:extLst>
-          </p:cNvPr>
-          <p:cNvSpPr txBox="1"/>
-          <p:nvPr/>
-        </p:nvSpPr>
-        <p:spPr>
-          <a:xfrm>
-            <a:off x="1037440" y="1858326"/>
-            <a:ext cx="2646727" cy="369332"/>
-          </a:xfrm>
-          <a:prstGeom prst="rect">
-            <a:avLst/>
-          </a:prstGeom>
-          <a:noFill/>
-        </p:spPr>
-        <p:txBody>
-          <a:bodyPr wrap="square" rtlCol="0">
-            <a:spAutoFit/>
-          </a:bodyPr>
-          <a:lstStyle/>
-          <a:p>
-            <a:r>
-              <a:rPr lang="en-US" dirty="0" err="1"/>
-              <a:t>RetryPolicy</a:t>
-            </a:r>
-            <a:r>
-              <a:rPr lang="en-US" dirty="0"/>
-              <a:t> - Options</a:t>
-            </a:r>
-          </a:p>
-        </p:txBody>
-      </p:sp>
-      <p:sp>
-        <p:nvSpPr>
-          <p:cNvPr id="14" name="Rectangle 13">
-            <a:extLst>
-              <a:ext uri="{FF2B5EF4-FFF2-40B4-BE49-F238E27FC236}">
-                <a16:creationId xmlns:a16="http://schemas.microsoft.com/office/drawing/2014/main" id="{F6DFCE42-8274-44B7-AE74-466B992CD794}"/>
-              </a:ext>
-            </a:extLst>
-          </p:cNvPr>
-          <p:cNvSpPr/>
-          <p:nvPr/>
-        </p:nvSpPr>
-        <p:spPr>
-          <a:xfrm>
-            <a:off x="5656976" y="1204675"/>
-            <a:ext cx="6087612" cy="3970318"/>
-          </a:xfrm>
-          <a:prstGeom prst="rect">
-            <a:avLst/>
-          </a:prstGeom>
-        </p:spPr>
-        <p:txBody>
-          <a:bodyPr wrap="square">
-            <a:spAutoFit/>
-          </a:bodyPr>
-          <a:lstStyle/>
-          <a:p>
-            <a:r>
-              <a:rPr lang="en-US" dirty="0"/>
-              <a:t> “</a:t>
-            </a:r>
-            <a:r>
-              <a:rPr lang="en-US" dirty="0" err="1"/>
-              <a:t>DefaultPolicy</a:t>
-            </a:r>
-            <a:r>
-              <a:rPr lang="en-US" dirty="0"/>
-              <a:t>": {</a:t>
-            </a:r>
-          </a:p>
-          <a:p>
-            <a:r>
-              <a:rPr lang="en-US" dirty="0"/>
-              <a:t>    "</a:t>
-            </a:r>
-            <a:r>
-              <a:rPr lang="en-US" dirty="0" err="1"/>
-              <a:t>CircuitBreaker</a:t>
-            </a:r>
-            <a:r>
-              <a:rPr lang="en-US" dirty="0"/>
-              <a:t>": {</a:t>
-            </a:r>
-          </a:p>
-          <a:p>
-            <a:r>
-              <a:rPr lang="en-US" dirty="0"/>
-              <a:t>      "</a:t>
-            </a:r>
-            <a:r>
-              <a:rPr lang="en-US" dirty="0" err="1"/>
-              <a:t>DurationOfBreak</a:t>
-            </a:r>
-            <a:r>
-              <a:rPr lang="en-US" dirty="0"/>
-              <a:t>": "00:00:10",</a:t>
-            </a:r>
-          </a:p>
-          <a:p>
-            <a:r>
-              <a:rPr lang="en-US" dirty="0"/>
-              <a:t>      "</a:t>
-            </a:r>
-            <a:r>
-              <a:rPr lang="en-US" dirty="0" err="1"/>
-              <a:t>ExceptionsAllowedBeforeBreaking</a:t>
-            </a:r>
-            <a:r>
-              <a:rPr lang="en-US" dirty="0"/>
-              <a:t>": 2</a:t>
-            </a:r>
-          </a:p>
-          <a:p>
-            <a:r>
-              <a:rPr lang="en-US" dirty="0"/>
-              <a:t>    },</a:t>
-            </a:r>
-          </a:p>
-          <a:p>
-            <a:r>
-              <a:rPr lang="en-US" dirty="0"/>
-              <a:t>    "Retry": {</a:t>
-            </a:r>
-          </a:p>
-          <a:p>
-            <a:r>
-              <a:rPr lang="en-US" dirty="0"/>
-              <a:t>      "</a:t>
-            </a:r>
-            <a:r>
-              <a:rPr lang="en-US" dirty="0" err="1"/>
-              <a:t>BackoffPower</a:t>
-            </a:r>
-            <a:r>
-              <a:rPr lang="en-US" dirty="0"/>
-              <a:t>": 2,</a:t>
-            </a:r>
-          </a:p>
-          <a:p>
-            <a:r>
-              <a:rPr lang="en-US" dirty="0"/>
-              <a:t>      "Count": 3</a:t>
-            </a:r>
-          </a:p>
-          <a:p>
-            <a:r>
-              <a:rPr lang="en-US" dirty="0"/>
-              <a:t>    },</a:t>
-            </a:r>
-          </a:p>
-          <a:p>
-            <a:endParaRPr lang="en-US" dirty="0"/>
-          </a:p>
-          <a:p>
-            <a:r>
-              <a:rPr lang="en-US" dirty="0"/>
-              <a:t>    "</a:t>
-            </a:r>
-            <a:r>
-              <a:rPr lang="en-US" dirty="0" err="1"/>
-              <a:t>RequestTimeout</a:t>
-            </a:r>
-            <a:r>
-              <a:rPr lang="en-US" dirty="0"/>
-              <a:t>": {</a:t>
-            </a:r>
-          </a:p>
-          <a:p>
-            <a:r>
-              <a:rPr lang="en-US" dirty="0"/>
-              <a:t>      "Timeout": "00:00:03"</a:t>
-            </a:r>
-          </a:p>
-          <a:p>
-            <a:r>
-              <a:rPr lang="en-US" dirty="0"/>
-              <a:t>    }</a:t>
-            </a:r>
-          </a:p>
-          <a:p>
-            <a:r>
-              <a:rPr lang="en-US" dirty="0"/>
-              <a:t>  }</a:t>
-            </a:r>
-          </a:p>
-        </p:txBody>
-      </p:sp>
-      <p:sp>
-        <p:nvSpPr>
-          <p:cNvPr id="15" name="Rectangle 14">
-            <a:extLst>
-              <a:ext uri="{FF2B5EF4-FFF2-40B4-BE49-F238E27FC236}">
-                <a16:creationId xmlns:a16="http://schemas.microsoft.com/office/drawing/2014/main" id="{628F4005-596A-4532-9BB2-0EC63A3BD612}"/>
-              </a:ext>
-            </a:extLst>
-          </p:cNvPr>
-          <p:cNvSpPr/>
-          <p:nvPr/>
-        </p:nvSpPr>
-        <p:spPr>
-          <a:xfrm>
-            <a:off x="1037440" y="1488994"/>
-            <a:ext cx="2400016" cy="369332"/>
-          </a:xfrm>
-          <a:prstGeom prst="rect">
-            <a:avLst/>
-          </a:prstGeom>
-        </p:spPr>
-        <p:txBody>
-          <a:bodyPr wrap="none">
-            <a:spAutoFit/>
-          </a:bodyPr>
-          <a:lstStyle/>
-          <a:p>
-            <a:r>
-              <a:rPr lang="en-US" dirty="0" err="1"/>
-              <a:t>CircuitBreakerPolicy</a:t>
-            </a:r>
-            <a:endParaRPr lang="en-US" dirty="0"/>
-          </a:p>
-        </p:txBody>
-      </p:sp>
-    </p:spTree>
-    <p:extLst>
-      <p:ext uri="{BB962C8B-B14F-4D97-AF65-F5344CB8AC3E}">
-        <p14:creationId xmlns:p14="http://schemas.microsoft.com/office/powerpoint/2010/main" val="3719812656"/>
-      </p:ext>
-    </p:extLst>
-  </p:cSld>
-  <p:clrMapOvr>
-    <a:masterClrMapping/>
-  </p:clrMapOvr>
-</p:sld>
-</file>
-
 <file path=ppt/slides/slide5.xml><?xml version="1.0" encoding="utf-8"?>
 <p:sld xmlns:a="http://schemas.openxmlformats.org/drawingml/2006/main" xmlns:r="http://schemas.openxmlformats.org/officeDocument/2006/relationships" xmlns:p="http://schemas.openxmlformats.org/presentationml/2006/main">
   <p:cSld>
@@ -6976,8 +7032,8 @@
         </p:nvSpPr>
         <p:spPr>
           <a:xfrm>
-            <a:off x="517321" y="3150339"/>
-            <a:ext cx="3906473" cy="369332"/>
+            <a:off x="1037441" y="2263633"/>
+            <a:ext cx="2855052" cy="369332"/>
           </a:xfrm>
           <a:prstGeom prst="rect">
             <a:avLst/>
@@ -6992,11 +7048,11 @@
           <a:p>
             <a:r>
               <a:rPr lang="en-US" dirty="0" err="1"/>
-              <a:t>HttpTimeoutPolicy</a:t>
-            </a:r>
-            <a:r>
-              <a:rPr lang="en-US" dirty="0"/>
-              <a:t> Policy Options</a:t>
+              <a:t>TimeoutPolicy</a:t>
+            </a:r>
+            <a:r>
+              <a:rPr lang="en-US" dirty="0"/>
+              <a:t> - Options</a:t>
             </a:r>
           </a:p>
         </p:txBody>
@@ -7015,8 +7071,8 @@
         </p:nvSpPr>
         <p:spPr>
           <a:xfrm>
-            <a:off x="373311" y="2031643"/>
-            <a:ext cx="2097247" cy="369332"/>
+            <a:off x="373310" y="1083687"/>
+            <a:ext cx="4416803" cy="369332"/>
           </a:xfrm>
           <a:prstGeom prst="rect">
             <a:avLst/>
@@ -7031,7 +7087,7 @@
           <a:p>
             <a:r>
               <a:rPr lang="en-US" dirty="0"/>
-              <a:t>Policy Options</a:t>
+              <a:t>Default Policy - Policy Options Section</a:t>
             </a:r>
           </a:p>
         </p:txBody>
@@ -7050,8 +7106,8 @@
         </p:nvSpPr>
         <p:spPr>
           <a:xfrm>
-            <a:off x="517321" y="2590991"/>
-            <a:ext cx="2097247" cy="369332"/>
+            <a:off x="1037440" y="1858326"/>
+            <a:ext cx="2646727" cy="369332"/>
           </a:xfrm>
           <a:prstGeom prst="rect">
             <a:avLst/>
@@ -7065,118 +7121,203 @@
           <a:lstStyle/>
           <a:p>
             <a:r>
-              <a:rPr lang="en-US" dirty="0"/>
-              <a:t>Policy Options</a:t>
-            </a:r>
-          </a:p>
-        </p:txBody>
-      </p:sp>
-      <p:sp>
-        <p:nvSpPr>
-          <p:cNvPr id="7" name="TextBox 6">
+              <a:rPr lang="en-US" dirty="0" err="1"/>
+              <a:t>RetryPolicy</a:t>
+            </a:r>
+            <a:r>
+              <a:rPr lang="en-US" dirty="0"/>
+              <a:t> - Options</a:t>
+            </a:r>
+          </a:p>
+        </p:txBody>
+      </p:sp>
+      <p:sp>
+        <p:nvSpPr>
+          <p:cNvPr id="14" name="Rectangle 13">
             <a:extLst>
               <a:ext uri="{FF2B5EF4-FFF2-40B4-BE49-F238E27FC236}">
-                <a16:creationId xmlns:a16="http://schemas.microsoft.com/office/drawing/2014/main" id="{C62958F4-FF84-4F26-8136-8561FFACB3A5}"/>
+                <a16:creationId xmlns:a16="http://schemas.microsoft.com/office/drawing/2014/main" id="{F6DFCE42-8274-44B7-AE74-466B992CD794}"/>
               </a:ext>
             </a:extLst>
           </p:cNvPr>
-          <p:cNvSpPr txBox="1"/>
+          <p:cNvSpPr/>
           <p:nvPr/>
         </p:nvSpPr>
         <p:spPr>
           <a:xfrm>
-            <a:off x="8697988" y="1672099"/>
-            <a:ext cx="2653720" cy="369332"/>
+            <a:off x="5656976" y="1204675"/>
+            <a:ext cx="6087612" cy="3970318"/>
           </a:xfrm>
           <a:prstGeom prst="rect">
             <a:avLst/>
           </a:prstGeom>
-          <a:noFill/>
-        </p:spPr>
-        <p:txBody>
-          <a:bodyPr wrap="square" rtlCol="0">
+        </p:spPr>
+        <p:txBody>
+          <a:bodyPr wrap="square">
             <a:spAutoFit/>
           </a:bodyPr>
           <a:lstStyle/>
           <a:p>
             <a:r>
+              <a:rPr lang="en-US" dirty="0"/>
+              <a:t> “</a:t>
+            </a:r>
+            <a:r>
               <a:rPr lang="en-US" dirty="0" err="1"/>
-              <a:t>HttpClient</a:t>
-            </a:r>
-            <a:r>
-              <a:rPr lang="en-US" dirty="0"/>
-              <a:t> Options</a:t>
-            </a:r>
-          </a:p>
-        </p:txBody>
-      </p:sp>
-      <p:sp>
-        <p:nvSpPr>
-          <p:cNvPr id="8" name="TextBox 7">
+              <a:t>DefaultPolicy</a:t>
+            </a:r>
+            <a:r>
+              <a:rPr lang="en-US" dirty="0"/>
+              <a:t>": {</a:t>
+            </a:r>
+          </a:p>
+          <a:p>
+            <a:r>
+              <a:rPr lang="en-US" dirty="0"/>
+              <a:t>    "</a:t>
+            </a:r>
+            <a:r>
+              <a:rPr lang="en-US" dirty="0" err="1"/>
+              <a:t>CircuitBreaker</a:t>
+            </a:r>
+            <a:r>
+              <a:rPr lang="en-US" dirty="0"/>
+              <a:t>": {</a:t>
+            </a:r>
+          </a:p>
+          <a:p>
+            <a:r>
+              <a:rPr lang="en-US" dirty="0"/>
+              <a:t>      "</a:t>
+            </a:r>
+            <a:r>
+              <a:rPr lang="en-US" dirty="0" err="1"/>
+              <a:t>DurationOfBreak</a:t>
+            </a:r>
+            <a:r>
+              <a:rPr lang="en-US" dirty="0"/>
+              <a:t>": "00:00:10",</a:t>
+            </a:r>
+          </a:p>
+          <a:p>
+            <a:r>
+              <a:rPr lang="en-US" dirty="0"/>
+              <a:t>      "</a:t>
+            </a:r>
+            <a:r>
+              <a:rPr lang="en-US" dirty="0" err="1"/>
+              <a:t>ExceptionsAllowedBeforeBreaking</a:t>
+            </a:r>
+            <a:r>
+              <a:rPr lang="en-US" dirty="0"/>
+              <a:t>": 2</a:t>
+            </a:r>
+          </a:p>
+          <a:p>
+            <a:r>
+              <a:rPr lang="en-US" dirty="0"/>
+              <a:t>    },</a:t>
+            </a:r>
+          </a:p>
+          <a:p>
+            <a:r>
+              <a:rPr lang="en-US" dirty="0"/>
+              <a:t>    "Retry": {</a:t>
+            </a:r>
+          </a:p>
+          <a:p>
+            <a:r>
+              <a:rPr lang="en-US" dirty="0"/>
+              <a:t>      "</a:t>
+            </a:r>
+            <a:r>
+              <a:rPr lang="en-US" dirty="0" err="1"/>
+              <a:t>BackoffPower</a:t>
+            </a:r>
+            <a:r>
+              <a:rPr lang="en-US" dirty="0"/>
+              <a:t>": 2,</a:t>
+            </a:r>
+          </a:p>
+          <a:p>
+            <a:r>
+              <a:rPr lang="en-US" dirty="0"/>
+              <a:t>      "Count": 3</a:t>
+            </a:r>
+          </a:p>
+          <a:p>
+            <a:r>
+              <a:rPr lang="en-US" dirty="0"/>
+              <a:t>    },</a:t>
+            </a:r>
+          </a:p>
+          <a:p>
+            <a:endParaRPr lang="en-US" dirty="0"/>
+          </a:p>
+          <a:p>
+            <a:r>
+              <a:rPr lang="en-US" dirty="0"/>
+              <a:t>    "</a:t>
+            </a:r>
+            <a:r>
+              <a:rPr lang="en-US" dirty="0" err="1"/>
+              <a:t>RequestTimeout</a:t>
+            </a:r>
+            <a:r>
+              <a:rPr lang="en-US" dirty="0"/>
+              <a:t>": {</a:t>
+            </a:r>
+          </a:p>
+          <a:p>
+            <a:r>
+              <a:rPr lang="en-US" dirty="0"/>
+              <a:t>      "Timeout": "00:00:03"</a:t>
+            </a:r>
+          </a:p>
+          <a:p>
+            <a:r>
+              <a:rPr lang="en-US" dirty="0"/>
+              <a:t>    }</a:t>
+            </a:r>
+          </a:p>
+          <a:p>
+            <a:r>
+              <a:rPr lang="en-US" dirty="0"/>
+              <a:t>  }</a:t>
+            </a:r>
+          </a:p>
+        </p:txBody>
+      </p:sp>
+      <p:sp>
+        <p:nvSpPr>
+          <p:cNvPr id="15" name="Rectangle 14">
             <a:extLst>
               <a:ext uri="{FF2B5EF4-FFF2-40B4-BE49-F238E27FC236}">
-                <a16:creationId xmlns:a16="http://schemas.microsoft.com/office/drawing/2014/main" id="{6FE4BB14-43B7-485E-87FA-4EFE7C36748F}"/>
+                <a16:creationId xmlns:a16="http://schemas.microsoft.com/office/drawing/2014/main" id="{628F4005-596A-4532-9BB2-0EC63A3BD612}"/>
               </a:ext>
             </a:extLst>
           </p:cNvPr>
-          <p:cNvSpPr txBox="1"/>
+          <p:cNvSpPr/>
           <p:nvPr/>
         </p:nvSpPr>
         <p:spPr>
           <a:xfrm>
-            <a:off x="4639113" y="1846977"/>
-            <a:ext cx="2097247" cy="369332"/>
+            <a:off x="1037440" y="1488994"/>
+            <a:ext cx="2400016" cy="369332"/>
           </a:xfrm>
           <a:prstGeom prst="rect">
             <a:avLst/>
           </a:prstGeom>
-          <a:noFill/>
-        </p:spPr>
-        <p:txBody>
-          <a:bodyPr wrap="square" rtlCol="0">
+        </p:spPr>
+        <p:txBody>
+          <a:bodyPr wrap="none">
             <a:spAutoFit/>
           </a:bodyPr>
           <a:lstStyle/>
           <a:p>
             <a:r>
               <a:rPr lang="en-US" dirty="0" err="1"/>
-              <a:t>HttpClient</a:t>
-            </a:r>
-            <a:endParaRPr lang="en-US" dirty="0"/>
-          </a:p>
-        </p:txBody>
-      </p:sp>
-      <p:sp>
-        <p:nvSpPr>
-          <p:cNvPr id="9" name="TextBox 8">
-            <a:extLst>
-              <a:ext uri="{FF2B5EF4-FFF2-40B4-BE49-F238E27FC236}">
-                <a16:creationId xmlns:a16="http://schemas.microsoft.com/office/drawing/2014/main" id="{CE9F0A69-AA02-4CA3-AC51-C289056736A6}"/>
-              </a:ext>
-            </a:extLst>
-          </p:cNvPr>
-          <p:cNvSpPr txBox="1"/>
-          <p:nvPr/>
-        </p:nvSpPr>
-        <p:spPr>
-          <a:xfrm>
-            <a:off x="5181600" y="2240452"/>
-            <a:ext cx="2611772" cy="369332"/>
-          </a:xfrm>
-          <a:prstGeom prst="rect">
-            <a:avLst/>
-          </a:prstGeom>
-          <a:noFill/>
-        </p:spPr>
-        <p:txBody>
-          <a:bodyPr wrap="square" rtlCol="0">
-            <a:spAutoFit/>
-          </a:bodyPr>
-          <a:lstStyle/>
-          <a:p>
-            <a:r>
-              <a:rPr lang="en-US" dirty="0" err="1"/>
-              <a:t>DelegatingHandler</a:t>
+              <a:t>CircuitBreakerPolicy</a:t>
             </a:r>
             <a:endParaRPr lang="en-US" dirty="0"/>
           </a:p>
@@ -7185,7 +7326,7 @@
     </p:spTree>
     <p:extLst>
       <p:ext uri="{BB962C8B-B14F-4D97-AF65-F5344CB8AC3E}">
-        <p14:creationId xmlns:p14="http://schemas.microsoft.com/office/powerpoint/2010/main" val="129308691"/>
+        <p14:creationId xmlns:p14="http://schemas.microsoft.com/office/powerpoint/2010/main" val="3719812656"/>
       </p:ext>
     </p:extLst>
   </p:cSld>

</xml_diff>